<commit_message>
editOrders OK + preaentation
</commit_message>
<xml_diff>
--- a/Разработка cайта для магазина роллов и суши.pptx
+++ b/Разработка cайта для магазина роллов и суши.pptx
@@ -10,15 +10,8 @@
     <p:sldId id="258" r:id="rId4"/>
     <p:sldId id="259" r:id="rId5"/>
     <p:sldId id="269" r:id="rId6"/>
-    <p:sldId id="266" r:id="rId7"/>
-    <p:sldId id="265" r:id="rId8"/>
-    <p:sldId id="267" r:id="rId9"/>
-    <p:sldId id="268" r:id="rId10"/>
-    <p:sldId id="264" r:id="rId11"/>
-    <p:sldId id="262" r:id="rId12"/>
-    <p:sldId id="260" r:id="rId13"/>
-    <p:sldId id="261" r:id="rId14"/>
-    <p:sldId id="263" r:id="rId15"/>
+    <p:sldId id="265" r:id="rId7"/>
+    <p:sldId id="267" r:id="rId8"/>
   </p:sldIdLst>
   <p:sldSz cx="12192000" cy="6858000"/>
   <p:notesSz cx="6858000" cy="9144000"/>
@@ -117,6 +110,11 @@
       </a:defRPr>
     </a:lvl9pPr>
   </p:defaultTextStyle>
+  <p:extLst>
+    <p:ext uri="{EFAFB233-063F-42B5-8137-9DF3F51BA10A}">
+      <p15:sldGuideLst xmlns:p15="http://schemas.microsoft.com/office/powerpoint/2012/main"/>
+    </p:ext>
+  </p:extLst>
 </p:presentation>
 </file>
 
@@ -267,7 +265,7 @@
           <a:p>
             <a:fld id="{F7BFCE7A-43A2-4EF4-86AC-1369E0CE8FED}" type="datetimeFigureOut">
               <a:rPr lang="ru-RU" smtClean="0"/>
-              <a:t>24.11.2021</a:t>
+              <a:t>26.11.2021</a:t>
             </a:fld>
             <a:endParaRPr lang="ru-RU"/>
           </a:p>
@@ -465,7 +463,7 @@
           <a:p>
             <a:fld id="{F7BFCE7A-43A2-4EF4-86AC-1369E0CE8FED}" type="datetimeFigureOut">
               <a:rPr lang="ru-RU" smtClean="0"/>
-              <a:t>24.11.2021</a:t>
+              <a:t>26.11.2021</a:t>
             </a:fld>
             <a:endParaRPr lang="ru-RU"/>
           </a:p>
@@ -673,7 +671,7 @@
           <a:p>
             <a:fld id="{F7BFCE7A-43A2-4EF4-86AC-1369E0CE8FED}" type="datetimeFigureOut">
               <a:rPr lang="ru-RU" smtClean="0"/>
-              <a:t>24.11.2021</a:t>
+              <a:t>26.11.2021</a:t>
             </a:fld>
             <a:endParaRPr lang="ru-RU"/>
           </a:p>
@@ -871,7 +869,7 @@
           <a:p>
             <a:fld id="{F7BFCE7A-43A2-4EF4-86AC-1369E0CE8FED}" type="datetimeFigureOut">
               <a:rPr lang="ru-RU" smtClean="0"/>
-              <a:t>24.11.2021</a:t>
+              <a:t>26.11.2021</a:t>
             </a:fld>
             <a:endParaRPr lang="ru-RU"/>
           </a:p>
@@ -1146,7 +1144,7 @@
           <a:p>
             <a:fld id="{F7BFCE7A-43A2-4EF4-86AC-1369E0CE8FED}" type="datetimeFigureOut">
               <a:rPr lang="ru-RU" smtClean="0"/>
-              <a:t>24.11.2021</a:t>
+              <a:t>26.11.2021</a:t>
             </a:fld>
             <a:endParaRPr lang="ru-RU"/>
           </a:p>
@@ -1411,7 +1409,7 @@
           <a:p>
             <a:fld id="{F7BFCE7A-43A2-4EF4-86AC-1369E0CE8FED}" type="datetimeFigureOut">
               <a:rPr lang="ru-RU" smtClean="0"/>
-              <a:t>24.11.2021</a:t>
+              <a:t>26.11.2021</a:t>
             </a:fld>
             <a:endParaRPr lang="ru-RU"/>
           </a:p>
@@ -1823,7 +1821,7 @@
           <a:p>
             <a:fld id="{F7BFCE7A-43A2-4EF4-86AC-1369E0CE8FED}" type="datetimeFigureOut">
               <a:rPr lang="ru-RU" smtClean="0"/>
-              <a:t>24.11.2021</a:t>
+              <a:t>26.11.2021</a:t>
             </a:fld>
             <a:endParaRPr lang="ru-RU"/>
           </a:p>
@@ -1964,7 +1962,7 @@
           <a:p>
             <a:fld id="{F7BFCE7A-43A2-4EF4-86AC-1369E0CE8FED}" type="datetimeFigureOut">
               <a:rPr lang="ru-RU" smtClean="0"/>
-              <a:t>24.11.2021</a:t>
+              <a:t>26.11.2021</a:t>
             </a:fld>
             <a:endParaRPr lang="ru-RU"/>
           </a:p>
@@ -2077,7 +2075,7 @@
           <a:p>
             <a:fld id="{F7BFCE7A-43A2-4EF4-86AC-1369E0CE8FED}" type="datetimeFigureOut">
               <a:rPr lang="ru-RU" smtClean="0"/>
-              <a:t>24.11.2021</a:t>
+              <a:t>26.11.2021</a:t>
             </a:fld>
             <a:endParaRPr lang="ru-RU"/>
           </a:p>
@@ -2388,7 +2386,7 @@
           <a:p>
             <a:fld id="{F7BFCE7A-43A2-4EF4-86AC-1369E0CE8FED}" type="datetimeFigureOut">
               <a:rPr lang="ru-RU" smtClean="0"/>
-              <a:t>24.11.2021</a:t>
+              <a:t>26.11.2021</a:t>
             </a:fld>
             <a:endParaRPr lang="ru-RU"/>
           </a:p>
@@ -2676,7 +2674,7 @@
           <a:p>
             <a:fld id="{F7BFCE7A-43A2-4EF4-86AC-1369E0CE8FED}" type="datetimeFigureOut">
               <a:rPr lang="ru-RU" smtClean="0"/>
-              <a:t>24.11.2021</a:t>
+              <a:t>26.11.2021</a:t>
             </a:fld>
             <a:endParaRPr lang="ru-RU"/>
           </a:p>
@@ -2917,7 +2915,7 @@
           <a:p>
             <a:fld id="{F7BFCE7A-43A2-4EF4-86AC-1369E0CE8FED}" type="datetimeFigureOut">
               <a:rPr lang="ru-RU" smtClean="0"/>
-              <a:t>24.11.2021</a:t>
+              <a:t>26.11.2021</a:t>
             </a:fld>
             <a:endParaRPr lang="ru-RU"/>
           </a:p>
@@ -3453,2626 +3451,6 @@
 </p:sld>
 </file>
 
-<file path=ppt/slides/slide10.xml><?xml version="1.0" encoding="utf-8"?>
-<p:sld xmlns:a="http://schemas.openxmlformats.org/drawingml/2006/main" xmlns:r="http://schemas.openxmlformats.org/officeDocument/2006/relationships" xmlns:p="http://schemas.openxmlformats.org/presentationml/2006/main">
-  <p:cSld>
-    <p:spTree>
-      <p:nvGrpSpPr>
-        <p:cNvPr id="1" name=""/>
-        <p:cNvGrpSpPr/>
-        <p:nvPr/>
-      </p:nvGrpSpPr>
-      <p:grpSpPr>
-        <a:xfrm>
-          <a:off x="0" y="0"/>
-          <a:ext cx="0" cy="0"/>
-          <a:chOff x="0" y="0"/>
-          <a:chExt cx="0" cy="0"/>
-        </a:xfrm>
-      </p:grpSpPr>
-      <p:sp>
-        <p:nvSpPr>
-          <p:cNvPr id="2" name="Заголовок 1">
-            <a:extLst>
-              <a:ext uri="{FF2B5EF4-FFF2-40B4-BE49-F238E27FC236}">
-                <a16:creationId xmlns:a16="http://schemas.microsoft.com/office/drawing/2014/main" id="{A5E470A9-7F3A-4219-BC6A-C6A9DAEE267B}"/>
-              </a:ext>
-            </a:extLst>
-          </p:cNvPr>
-          <p:cNvSpPr>
-            <a:spLocks noGrp="1"/>
-          </p:cNvSpPr>
-          <p:nvPr>
-            <p:ph type="title"/>
-          </p:nvPr>
-        </p:nvSpPr>
-        <p:spPr>
-          <a:xfrm>
-            <a:off x="810985" y="171451"/>
-            <a:ext cx="10570029" cy="650875"/>
-          </a:xfrm>
-        </p:spPr>
-        <p:txBody>
-          <a:bodyPr>
-            <a:normAutofit fontScale="90000"/>
-          </a:bodyPr>
-          <a:lstStyle/>
-          <a:p>
-            <a:pPr algn="ctr"/>
-            <a:r>
-              <a:rPr lang="ru-RU" dirty="0"/>
-              <a:t>Стек технологий</a:t>
-            </a:r>
-          </a:p>
-        </p:txBody>
-      </p:sp>
-      <p:sp>
-        <p:nvSpPr>
-          <p:cNvPr id="3" name="Объект 2">
-            <a:extLst>
-              <a:ext uri="{FF2B5EF4-FFF2-40B4-BE49-F238E27FC236}">
-                <a16:creationId xmlns:a16="http://schemas.microsoft.com/office/drawing/2014/main" id="{882CB824-C634-4F6E-A99F-D1DB4291393E}"/>
-              </a:ext>
-            </a:extLst>
-          </p:cNvPr>
-          <p:cNvSpPr>
-            <a:spLocks noGrp="1"/>
-          </p:cNvSpPr>
-          <p:nvPr>
-            <p:ph idx="1"/>
-          </p:nvPr>
-        </p:nvSpPr>
-        <p:spPr>
-          <a:xfrm>
-            <a:off x="252128" y="991166"/>
-            <a:ext cx="4588215" cy="5431063"/>
-          </a:xfrm>
-        </p:spPr>
-        <p:txBody>
-          <a:bodyPr>
-            <a:normAutofit/>
-          </a:bodyPr>
-          <a:lstStyle/>
-          <a:p>
-            <a:r>
-              <a:rPr lang="en-US" dirty="0"/>
-              <a:t>Java</a:t>
-            </a:r>
-            <a:endParaRPr lang="ru-RU" dirty="0"/>
-          </a:p>
-          <a:p>
-            <a:r>
-              <a:rPr lang="en-US" dirty="0"/>
-              <a:t>JavaScript </a:t>
-            </a:r>
-            <a:r>
-              <a:rPr lang="ru-RU" dirty="0"/>
-              <a:t>и </a:t>
-            </a:r>
-            <a:r>
-              <a:rPr lang="en-US" dirty="0"/>
-              <a:t>HTML </a:t>
-            </a:r>
-            <a:endParaRPr lang="ru-RU" dirty="0"/>
-          </a:p>
-          <a:p>
-            <a:r>
-              <a:rPr lang="en-US" dirty="0"/>
-              <a:t>IntelliJ IDEA</a:t>
-            </a:r>
-            <a:endParaRPr lang="ru-RU" dirty="0"/>
-          </a:p>
-          <a:p>
-            <a:r>
-              <a:rPr lang="en-US" dirty="0"/>
-              <a:t>PostgreSQL </a:t>
-            </a:r>
-            <a:r>
-              <a:rPr lang="ru-RU" dirty="0"/>
-              <a:t>и </a:t>
-            </a:r>
-            <a:r>
-              <a:rPr lang="en-US" dirty="0"/>
-              <a:t>H2</a:t>
-            </a:r>
-            <a:endParaRPr lang="ru-RU" dirty="0"/>
-          </a:p>
-          <a:p>
-            <a:r>
-              <a:rPr lang="ru-RU" dirty="0" err="1"/>
-              <a:t>Maven</a:t>
-            </a:r>
-            <a:endParaRPr lang="en-US" dirty="0"/>
-          </a:p>
-          <a:p>
-            <a:r>
-              <a:rPr lang="en-US" dirty="0"/>
-              <a:t>Lombok</a:t>
-            </a:r>
-            <a:endParaRPr lang="ru-RU" dirty="0"/>
-          </a:p>
-          <a:p>
-            <a:r>
-              <a:rPr lang="en-US" dirty="0" err="1"/>
-              <a:t>Thymeleaf</a:t>
-            </a:r>
-            <a:endParaRPr lang="ru-RU" dirty="0"/>
-          </a:p>
-          <a:p>
-            <a:r>
-              <a:rPr lang="ru-RU" dirty="0" err="1"/>
-              <a:t>Tomcat</a:t>
-            </a:r>
-            <a:endParaRPr lang="ru-RU" dirty="0"/>
-          </a:p>
-          <a:p>
-            <a:r>
-              <a:rPr lang="en-US" dirty="0"/>
-              <a:t>Hibernate</a:t>
-            </a:r>
-            <a:endParaRPr lang="ru-RU" dirty="0"/>
-          </a:p>
-          <a:p>
-            <a:endParaRPr lang="ru-RU" dirty="0"/>
-          </a:p>
-        </p:txBody>
-      </p:sp>
-      <p:sp>
-        <p:nvSpPr>
-          <p:cNvPr id="4" name="Объект 2">
-            <a:extLst>
-              <a:ext uri="{FF2B5EF4-FFF2-40B4-BE49-F238E27FC236}">
-                <a16:creationId xmlns:a16="http://schemas.microsoft.com/office/drawing/2014/main" id="{2419ED4A-17D7-4649-A435-404A1671F78A}"/>
-              </a:ext>
-            </a:extLst>
-          </p:cNvPr>
-          <p:cNvSpPr txBox="1">
-            <a:spLocks/>
-          </p:cNvSpPr>
-          <p:nvPr/>
-        </p:nvSpPr>
-        <p:spPr>
-          <a:xfrm>
-            <a:off x="5978781" y="1064979"/>
-            <a:ext cx="5459073" cy="5431063"/>
-          </a:xfrm>
-          <a:prstGeom prst="rect">
-            <a:avLst/>
-          </a:prstGeom>
-        </p:spPr>
-        <p:txBody>
-          <a:bodyPr vert="horz" lIns="91440" tIns="45720" rIns="91440" bIns="45720" rtlCol="0">
-            <a:normAutofit/>
-          </a:bodyPr>
-          <a:lstStyle>
-            <a:lvl1pPr marL="228600" indent="-228600" algn="l" defTabSz="914400" rtl="0" eaLnBrk="1" latinLnBrk="0" hangingPunct="1">
-              <a:lnSpc>
-                <a:spcPct val="90000"/>
-              </a:lnSpc>
-              <a:spcBef>
-                <a:spcPts val="1000"/>
-              </a:spcBef>
-              <a:buFont typeface="Arial" panose="020B0604020202020204" pitchFamily="34" charset="0"/>
-              <a:buChar char="•"/>
-              <a:defRPr sz="2800" kern="1200">
-                <a:solidFill>
-                  <a:schemeClr val="tx1"/>
-                </a:solidFill>
-                <a:latin typeface="+mn-lt"/>
-                <a:ea typeface="+mn-ea"/>
-                <a:cs typeface="+mn-cs"/>
-              </a:defRPr>
-            </a:lvl1pPr>
-            <a:lvl2pPr marL="685800" indent="-228600" algn="l" defTabSz="914400" rtl="0" eaLnBrk="1" latinLnBrk="0" hangingPunct="1">
-              <a:lnSpc>
-                <a:spcPct val="90000"/>
-              </a:lnSpc>
-              <a:spcBef>
-                <a:spcPts val="500"/>
-              </a:spcBef>
-              <a:buFont typeface="Arial" panose="020B0604020202020204" pitchFamily="34" charset="0"/>
-              <a:buChar char="•"/>
-              <a:defRPr sz="2400" kern="1200">
-                <a:solidFill>
-                  <a:schemeClr val="tx1"/>
-                </a:solidFill>
-                <a:latin typeface="+mn-lt"/>
-                <a:ea typeface="+mn-ea"/>
-                <a:cs typeface="+mn-cs"/>
-              </a:defRPr>
-            </a:lvl2pPr>
-            <a:lvl3pPr marL="1143000" indent="-228600" algn="l" defTabSz="914400" rtl="0" eaLnBrk="1" latinLnBrk="0" hangingPunct="1">
-              <a:lnSpc>
-                <a:spcPct val="90000"/>
-              </a:lnSpc>
-              <a:spcBef>
-                <a:spcPts val="500"/>
-              </a:spcBef>
-              <a:buFont typeface="Arial" panose="020B0604020202020204" pitchFamily="34" charset="0"/>
-              <a:buChar char="•"/>
-              <a:defRPr sz="2000" kern="1200">
-                <a:solidFill>
-                  <a:schemeClr val="tx1"/>
-                </a:solidFill>
-                <a:latin typeface="+mn-lt"/>
-                <a:ea typeface="+mn-ea"/>
-                <a:cs typeface="+mn-cs"/>
-              </a:defRPr>
-            </a:lvl3pPr>
-            <a:lvl4pPr marL="1600200" indent="-228600" algn="l" defTabSz="914400" rtl="0" eaLnBrk="1" latinLnBrk="0" hangingPunct="1">
-              <a:lnSpc>
-                <a:spcPct val="90000"/>
-              </a:lnSpc>
-              <a:spcBef>
-                <a:spcPts val="500"/>
-              </a:spcBef>
-              <a:buFont typeface="Arial" panose="020B0604020202020204" pitchFamily="34" charset="0"/>
-              <a:buChar char="•"/>
-              <a:defRPr sz="1800" kern="1200">
-                <a:solidFill>
-                  <a:schemeClr val="tx1"/>
-                </a:solidFill>
-                <a:latin typeface="+mn-lt"/>
-                <a:ea typeface="+mn-ea"/>
-                <a:cs typeface="+mn-cs"/>
-              </a:defRPr>
-            </a:lvl4pPr>
-            <a:lvl5pPr marL="2057400" indent="-228600" algn="l" defTabSz="914400" rtl="0" eaLnBrk="1" latinLnBrk="0" hangingPunct="1">
-              <a:lnSpc>
-                <a:spcPct val="90000"/>
-              </a:lnSpc>
-              <a:spcBef>
-                <a:spcPts val="500"/>
-              </a:spcBef>
-              <a:buFont typeface="Arial" panose="020B0604020202020204" pitchFamily="34" charset="0"/>
-              <a:buChar char="•"/>
-              <a:defRPr sz="1800" kern="1200">
-                <a:solidFill>
-                  <a:schemeClr val="tx1"/>
-                </a:solidFill>
-                <a:latin typeface="+mn-lt"/>
-                <a:ea typeface="+mn-ea"/>
-                <a:cs typeface="+mn-cs"/>
-              </a:defRPr>
-            </a:lvl5pPr>
-            <a:lvl6pPr marL="2514600" indent="-228600" algn="l" defTabSz="914400" rtl="0" eaLnBrk="1" latinLnBrk="0" hangingPunct="1">
-              <a:lnSpc>
-                <a:spcPct val="90000"/>
-              </a:lnSpc>
-              <a:spcBef>
-                <a:spcPts val="500"/>
-              </a:spcBef>
-              <a:buFont typeface="Arial" panose="020B0604020202020204" pitchFamily="34" charset="0"/>
-              <a:buChar char="•"/>
-              <a:defRPr sz="1800" kern="1200">
-                <a:solidFill>
-                  <a:schemeClr val="tx1"/>
-                </a:solidFill>
-                <a:latin typeface="+mn-lt"/>
-                <a:ea typeface="+mn-ea"/>
-                <a:cs typeface="+mn-cs"/>
-              </a:defRPr>
-            </a:lvl6pPr>
-            <a:lvl7pPr marL="2971800" indent="-228600" algn="l" defTabSz="914400" rtl="0" eaLnBrk="1" latinLnBrk="0" hangingPunct="1">
-              <a:lnSpc>
-                <a:spcPct val="90000"/>
-              </a:lnSpc>
-              <a:spcBef>
-                <a:spcPts val="500"/>
-              </a:spcBef>
-              <a:buFont typeface="Arial" panose="020B0604020202020204" pitchFamily="34" charset="0"/>
-              <a:buChar char="•"/>
-              <a:defRPr sz="1800" kern="1200">
-                <a:solidFill>
-                  <a:schemeClr val="tx1"/>
-                </a:solidFill>
-                <a:latin typeface="+mn-lt"/>
-                <a:ea typeface="+mn-ea"/>
-                <a:cs typeface="+mn-cs"/>
-              </a:defRPr>
-            </a:lvl7pPr>
-            <a:lvl8pPr marL="3429000" indent="-228600" algn="l" defTabSz="914400" rtl="0" eaLnBrk="1" latinLnBrk="0" hangingPunct="1">
-              <a:lnSpc>
-                <a:spcPct val="90000"/>
-              </a:lnSpc>
-              <a:spcBef>
-                <a:spcPts val="500"/>
-              </a:spcBef>
-              <a:buFont typeface="Arial" panose="020B0604020202020204" pitchFamily="34" charset="0"/>
-              <a:buChar char="•"/>
-              <a:defRPr sz="1800" kern="1200">
-                <a:solidFill>
-                  <a:schemeClr val="tx1"/>
-                </a:solidFill>
-                <a:latin typeface="+mn-lt"/>
-                <a:ea typeface="+mn-ea"/>
-                <a:cs typeface="+mn-cs"/>
-              </a:defRPr>
-            </a:lvl8pPr>
-            <a:lvl9pPr marL="3886200" indent="-228600" algn="l" defTabSz="914400" rtl="0" eaLnBrk="1" latinLnBrk="0" hangingPunct="1">
-              <a:lnSpc>
-                <a:spcPct val="90000"/>
-              </a:lnSpc>
-              <a:spcBef>
-                <a:spcPts val="500"/>
-              </a:spcBef>
-              <a:buFont typeface="Arial" panose="020B0604020202020204" pitchFamily="34" charset="0"/>
-              <a:buChar char="•"/>
-              <a:defRPr sz="1800" kern="1200">
-                <a:solidFill>
-                  <a:schemeClr val="tx1"/>
-                </a:solidFill>
-                <a:latin typeface="+mn-lt"/>
-                <a:ea typeface="+mn-ea"/>
-                <a:cs typeface="+mn-cs"/>
-              </a:defRPr>
-            </a:lvl9pPr>
-          </a:lstStyle>
-          <a:p>
-            <a:r>
-              <a:rPr lang="en-US" dirty="0"/>
-              <a:t>Spring Boot</a:t>
-            </a:r>
-          </a:p>
-          <a:p>
-            <a:r>
-              <a:rPr lang="en-US" dirty="0"/>
-              <a:t>Spring Data JPA</a:t>
-            </a:r>
-          </a:p>
-          <a:p>
-            <a:r>
-              <a:rPr lang="ru-RU" dirty="0"/>
-              <a:t>Spring Security</a:t>
-            </a:r>
-            <a:endParaRPr lang="en-US" dirty="0"/>
-          </a:p>
-          <a:p>
-            <a:r>
-              <a:rPr lang="ru-RU" dirty="0"/>
-              <a:t>Spring Web Services</a:t>
-            </a:r>
-            <a:endParaRPr lang="en-US" dirty="0"/>
-          </a:p>
-          <a:p>
-            <a:r>
-              <a:rPr lang="en-US" dirty="0"/>
-              <a:t>Spring MVC</a:t>
-            </a:r>
-          </a:p>
-          <a:p>
-            <a:r>
-              <a:rPr lang="en-US" dirty="0"/>
-              <a:t>Spring Integration</a:t>
-            </a:r>
-            <a:endParaRPr lang="ru-RU" dirty="0"/>
-          </a:p>
-          <a:p>
-            <a:r>
-              <a:rPr lang="en-US" dirty="0"/>
-              <a:t>Flyway</a:t>
-            </a:r>
-            <a:endParaRPr lang="ru-RU" dirty="0"/>
-          </a:p>
-          <a:p>
-            <a:r>
-              <a:rPr lang="en-US" dirty="0" err="1"/>
-              <a:t>Mapstruct</a:t>
-            </a:r>
-            <a:endParaRPr lang="ru-RU" dirty="0"/>
-          </a:p>
-          <a:p>
-            <a:r>
-              <a:rPr lang="en-US" dirty="0" err="1"/>
-              <a:t>Webjars</a:t>
-            </a:r>
-            <a:endParaRPr lang="ru-RU" dirty="0"/>
-          </a:p>
-          <a:p>
-            <a:endParaRPr lang="ru-RU" dirty="0"/>
-          </a:p>
-        </p:txBody>
-      </p:sp>
-    </p:spTree>
-    <p:extLst>
-      <p:ext uri="{BB962C8B-B14F-4D97-AF65-F5344CB8AC3E}">
-        <p14:creationId xmlns:p14="http://schemas.microsoft.com/office/powerpoint/2010/main" val="1043205617"/>
-      </p:ext>
-    </p:extLst>
-  </p:cSld>
-  <p:clrMapOvr>
-    <a:masterClrMapping/>
-  </p:clrMapOvr>
-</p:sld>
-</file>
-
-<file path=ppt/slides/slide11.xml><?xml version="1.0" encoding="utf-8"?>
-<p:sld xmlns:a="http://schemas.openxmlformats.org/drawingml/2006/main" xmlns:r="http://schemas.openxmlformats.org/officeDocument/2006/relationships" xmlns:p="http://schemas.openxmlformats.org/presentationml/2006/main">
-  <p:cSld>
-    <p:spTree>
-      <p:nvGrpSpPr>
-        <p:cNvPr id="1" name=""/>
-        <p:cNvGrpSpPr/>
-        <p:nvPr/>
-      </p:nvGrpSpPr>
-      <p:grpSpPr>
-        <a:xfrm>
-          <a:off x="0" y="0"/>
-          <a:ext cx="0" cy="0"/>
-          <a:chOff x="0" y="0"/>
-          <a:chExt cx="0" cy="0"/>
-        </a:xfrm>
-      </p:grpSpPr>
-      <p:sp>
-        <p:nvSpPr>
-          <p:cNvPr id="2" name="Заголовок 1">
-            <a:extLst>
-              <a:ext uri="{FF2B5EF4-FFF2-40B4-BE49-F238E27FC236}">
-                <a16:creationId xmlns:a16="http://schemas.microsoft.com/office/drawing/2014/main" id="{A5E470A9-7F3A-4219-BC6A-C6A9DAEE267B}"/>
-              </a:ext>
-            </a:extLst>
-          </p:cNvPr>
-          <p:cNvSpPr>
-            <a:spLocks noGrp="1"/>
-          </p:cNvSpPr>
-          <p:nvPr>
-            <p:ph type="title"/>
-          </p:nvPr>
-        </p:nvSpPr>
-        <p:spPr/>
-        <p:txBody>
-          <a:bodyPr/>
-          <a:lstStyle/>
-          <a:p>
-            <a:r>
-              <a:rPr lang="ru-RU" dirty="0"/>
-              <a:t>Стек технологий</a:t>
-            </a:r>
-          </a:p>
-        </p:txBody>
-      </p:sp>
-      <p:sp>
-        <p:nvSpPr>
-          <p:cNvPr id="3" name="Объект 2">
-            <a:extLst>
-              <a:ext uri="{FF2B5EF4-FFF2-40B4-BE49-F238E27FC236}">
-                <a16:creationId xmlns:a16="http://schemas.microsoft.com/office/drawing/2014/main" id="{882CB824-C634-4F6E-A99F-D1DB4291393E}"/>
-              </a:ext>
-            </a:extLst>
-          </p:cNvPr>
-          <p:cNvSpPr>
-            <a:spLocks noGrp="1"/>
-          </p:cNvSpPr>
-          <p:nvPr>
-            <p:ph idx="1"/>
-          </p:nvPr>
-        </p:nvSpPr>
-        <p:spPr>
-          <a:xfrm>
-            <a:off x="138112" y="1253330"/>
-            <a:ext cx="10515600" cy="5433219"/>
-          </a:xfrm>
-        </p:spPr>
-        <p:txBody>
-          <a:bodyPr>
-            <a:normAutofit fontScale="55000" lnSpcReduction="20000"/>
-          </a:bodyPr>
-          <a:lstStyle/>
-          <a:p>
-            <a:r>
-              <a:rPr lang="en-US" dirty="0"/>
-              <a:t>Java 8 </a:t>
-            </a:r>
-            <a:r>
-              <a:rPr lang="ru-RU" dirty="0"/>
-              <a:t>– </a:t>
-            </a:r>
-            <a:r>
-              <a:rPr lang="en-US" dirty="0"/>
-              <a:t>Backend</a:t>
-            </a:r>
-            <a:endParaRPr lang="ru-RU" dirty="0"/>
-          </a:p>
-          <a:p>
-            <a:r>
-              <a:rPr lang="en-US" dirty="0"/>
-              <a:t>JavaScript </a:t>
-            </a:r>
-            <a:r>
-              <a:rPr lang="ru-RU" dirty="0"/>
-              <a:t>и </a:t>
-            </a:r>
-            <a:r>
-              <a:rPr lang="en-US" dirty="0"/>
-              <a:t>HTML </a:t>
-            </a:r>
-            <a:r>
-              <a:rPr lang="ru-RU" dirty="0"/>
-              <a:t>– </a:t>
-            </a:r>
-            <a:r>
-              <a:rPr lang="en-US" dirty="0"/>
-              <a:t>Frontend</a:t>
-            </a:r>
-            <a:endParaRPr lang="ru-RU" dirty="0"/>
-          </a:p>
-          <a:p>
-            <a:r>
-              <a:rPr lang="en-US" dirty="0"/>
-              <a:t>IntelliJ IDEA </a:t>
-            </a:r>
-            <a:r>
-              <a:rPr lang="ru-RU" dirty="0"/>
-              <a:t>– среда разработки</a:t>
-            </a:r>
-          </a:p>
-          <a:p>
-            <a:r>
-              <a:rPr lang="en-US" dirty="0"/>
-              <a:t>PostgreSQL </a:t>
-            </a:r>
-            <a:r>
-              <a:rPr lang="ru-RU" dirty="0"/>
-              <a:t>и </a:t>
-            </a:r>
-            <a:r>
-              <a:rPr lang="en-US" dirty="0"/>
-              <a:t>H2 </a:t>
-            </a:r>
-            <a:r>
-              <a:rPr lang="ru-RU" dirty="0"/>
-              <a:t>– базы данных</a:t>
-            </a:r>
-            <a:endParaRPr lang="en-US" dirty="0"/>
-          </a:p>
-          <a:p>
-            <a:r>
-              <a:rPr lang="ru-RU" dirty="0" err="1"/>
-              <a:t>Maven</a:t>
-            </a:r>
-            <a:r>
-              <a:rPr lang="ru-RU" dirty="0"/>
-              <a:t> – автоматизация сборки проекта</a:t>
-            </a:r>
-            <a:endParaRPr lang="en-US" dirty="0"/>
-          </a:p>
-          <a:p>
-            <a:r>
-              <a:rPr lang="en-US" dirty="0"/>
-              <a:t>Spring Boot </a:t>
-            </a:r>
-            <a:r>
-              <a:rPr lang="ru-RU" dirty="0"/>
-              <a:t>– автоматизация рутинных действий по созданию и ускорению работы </a:t>
-            </a:r>
-            <a:r>
-              <a:rPr lang="en-US" dirty="0"/>
-              <a:t>Spring-</a:t>
-            </a:r>
-            <a:r>
-              <a:rPr lang="ru-RU" dirty="0"/>
-              <a:t>приложений</a:t>
-            </a:r>
-            <a:endParaRPr lang="en-US" dirty="0"/>
-          </a:p>
-          <a:p>
-            <a:r>
-              <a:rPr lang="en-US" dirty="0"/>
-              <a:t>Spring Data JPA</a:t>
-            </a:r>
-            <a:r>
-              <a:rPr lang="ru-RU" dirty="0"/>
-              <a:t> </a:t>
-            </a:r>
-            <a:r>
-              <a:rPr lang="en-US" dirty="0"/>
-              <a:t>+ Hibernate </a:t>
-            </a:r>
-            <a:r>
-              <a:rPr lang="ru-RU" dirty="0"/>
-              <a:t>– для сохранения и получения данных из реляционной БД</a:t>
-            </a:r>
-            <a:endParaRPr lang="en-US" dirty="0"/>
-          </a:p>
-          <a:p>
-            <a:r>
-              <a:rPr lang="ru-RU" dirty="0"/>
-              <a:t>Spring Security</a:t>
-            </a:r>
-            <a:r>
-              <a:rPr lang="en-US" dirty="0"/>
-              <a:t> </a:t>
-            </a:r>
-            <a:r>
-              <a:rPr lang="ru-RU" dirty="0"/>
-              <a:t>–  аутентификация и авторизация, а также другие возможности обеспечения безопасности</a:t>
-            </a:r>
-            <a:endParaRPr lang="en-US" dirty="0"/>
-          </a:p>
-          <a:p>
-            <a:r>
-              <a:rPr lang="ru-RU" dirty="0"/>
-              <a:t>Spring Web Services</a:t>
-            </a:r>
-            <a:r>
-              <a:rPr lang="en-US" dirty="0"/>
-              <a:t> </a:t>
-            </a:r>
-            <a:r>
-              <a:rPr lang="ru-RU" dirty="0"/>
-              <a:t>– создание управляемых документами веб-сервисов</a:t>
-            </a:r>
-            <a:endParaRPr lang="en-US" dirty="0"/>
-          </a:p>
-          <a:p>
-            <a:r>
-              <a:rPr lang="en-US" dirty="0"/>
-              <a:t>Spring MVC</a:t>
-            </a:r>
-            <a:r>
-              <a:rPr lang="ru-RU" dirty="0"/>
-              <a:t> – создание </a:t>
-            </a:r>
-            <a:r>
-              <a:rPr lang="ru-RU" dirty="0" err="1"/>
-              <a:t>web</a:t>
-            </a:r>
-            <a:r>
-              <a:rPr lang="ru-RU" dirty="0"/>
-              <a:t>, включая </a:t>
-            </a:r>
-            <a:r>
-              <a:rPr lang="ru-RU" dirty="0" err="1"/>
-              <a:t>RESTful</a:t>
-            </a:r>
-            <a:endParaRPr lang="en-US" dirty="0"/>
-          </a:p>
-          <a:p>
-            <a:r>
-              <a:rPr lang="en-US" dirty="0"/>
-              <a:t>Spring Integration</a:t>
-            </a:r>
-            <a:r>
-              <a:rPr lang="ru-RU" dirty="0"/>
-              <a:t> –</a:t>
-            </a:r>
-            <a:r>
-              <a:rPr lang="en-US" dirty="0"/>
-              <a:t> </a:t>
-            </a:r>
-            <a:r>
-              <a:rPr lang="ru-RU" dirty="0"/>
-              <a:t>обмен сообщениями между </a:t>
-            </a:r>
-            <a:r>
-              <a:rPr lang="en-US" dirty="0"/>
-              <a:t>Spring-</a:t>
-            </a:r>
-            <a:r>
-              <a:rPr lang="ru-RU" dirty="0"/>
-              <a:t>приложениями</a:t>
-            </a:r>
-          </a:p>
-          <a:p>
-            <a:r>
-              <a:rPr lang="en-US" dirty="0"/>
-              <a:t>Lombok </a:t>
-            </a:r>
-            <a:r>
-              <a:rPr lang="ru-RU" dirty="0"/>
-              <a:t>– плагин для генерации стандартного кода</a:t>
-            </a:r>
-          </a:p>
-          <a:p>
-            <a:r>
-              <a:rPr lang="en-US" dirty="0" err="1"/>
-              <a:t>Thymeleaf</a:t>
-            </a:r>
-            <a:r>
-              <a:rPr lang="en-US" dirty="0"/>
-              <a:t> </a:t>
-            </a:r>
-            <a:r>
-              <a:rPr lang="ru-RU" dirty="0"/>
-              <a:t>– </a:t>
-            </a:r>
-            <a:r>
-              <a:rPr lang="ru-RU" dirty="0" err="1"/>
-              <a:t>шаблонизатор</a:t>
-            </a:r>
-            <a:r>
-              <a:rPr lang="ru-RU" dirty="0"/>
-              <a:t> </a:t>
-            </a:r>
-            <a:r>
-              <a:rPr lang="en-US" dirty="0"/>
-              <a:t>html </a:t>
-            </a:r>
-            <a:r>
-              <a:rPr lang="ru-RU" dirty="0"/>
-              <a:t>страниц</a:t>
-            </a:r>
-          </a:p>
-          <a:p>
-            <a:r>
-              <a:rPr lang="ru-RU" dirty="0" err="1"/>
-              <a:t>Tomcat</a:t>
-            </a:r>
-            <a:r>
-              <a:rPr lang="ru-RU" dirty="0"/>
-              <a:t> – веб-сервер</a:t>
-            </a:r>
-          </a:p>
-          <a:p>
-            <a:r>
-              <a:rPr lang="en-US" dirty="0"/>
-              <a:t>Flyway</a:t>
-            </a:r>
-            <a:r>
-              <a:rPr lang="ru-RU" dirty="0"/>
-              <a:t> </a:t>
-            </a:r>
-            <a:r>
-              <a:rPr lang="en-US" dirty="0"/>
-              <a:t>– </a:t>
-            </a:r>
-            <a:r>
-              <a:rPr lang="ru-RU" dirty="0"/>
-              <a:t>контроль версий БД</a:t>
-            </a:r>
-          </a:p>
-          <a:p>
-            <a:r>
-              <a:rPr lang="en-US" dirty="0" err="1"/>
-              <a:t>Mapstruct</a:t>
-            </a:r>
-            <a:r>
-              <a:rPr lang="ru-RU" dirty="0"/>
-              <a:t> </a:t>
-            </a:r>
-            <a:r>
-              <a:rPr lang="en-US" dirty="0"/>
-              <a:t>– </a:t>
-            </a:r>
-            <a:r>
-              <a:rPr lang="ru-RU" dirty="0"/>
-              <a:t>обширный картограф для </a:t>
-            </a:r>
-            <a:r>
-              <a:rPr lang="en-US" dirty="0"/>
-              <a:t>Java-</a:t>
-            </a:r>
-            <a:r>
-              <a:rPr lang="ru-RU" dirty="0"/>
-              <a:t>компонентов для сопоставления объектов</a:t>
-            </a:r>
-          </a:p>
-          <a:p>
-            <a:r>
-              <a:rPr lang="en-US" dirty="0" err="1"/>
-              <a:t>Webjars</a:t>
-            </a:r>
-            <a:r>
-              <a:rPr lang="ru-RU" dirty="0"/>
-              <a:t> </a:t>
-            </a:r>
-            <a:r>
-              <a:rPr lang="en-US" dirty="0"/>
-              <a:t>–</a:t>
-            </a:r>
-            <a:r>
-              <a:rPr lang="ru-RU" dirty="0"/>
-              <a:t> добавления </a:t>
-            </a:r>
-            <a:r>
-              <a:rPr lang="en-US" dirty="0" err="1"/>
-              <a:t>javascript</a:t>
-            </a:r>
-            <a:r>
-              <a:rPr lang="en-US" dirty="0"/>
-              <a:t> </a:t>
-            </a:r>
-            <a:r>
-              <a:rPr lang="ru-RU" dirty="0"/>
-              <a:t>библиотек</a:t>
-            </a:r>
-          </a:p>
-          <a:p>
-            <a:endParaRPr lang="ru-RU" dirty="0"/>
-          </a:p>
-          <a:p>
-            <a:endParaRPr lang="ru-RU" dirty="0"/>
-          </a:p>
-        </p:txBody>
-      </p:sp>
-    </p:spTree>
-    <p:extLst>
-      <p:ext uri="{BB962C8B-B14F-4D97-AF65-F5344CB8AC3E}">
-        <p14:creationId xmlns:p14="http://schemas.microsoft.com/office/powerpoint/2010/main" val="3595668760"/>
-      </p:ext>
-    </p:extLst>
-  </p:cSld>
-  <p:clrMapOvr>
-    <a:masterClrMapping/>
-  </p:clrMapOvr>
-</p:sld>
-</file>
-
-<file path=ppt/slides/slide12.xml><?xml version="1.0" encoding="utf-8"?>
-<p:sld xmlns:a="http://schemas.openxmlformats.org/drawingml/2006/main" xmlns:r="http://schemas.openxmlformats.org/officeDocument/2006/relationships" xmlns:p="http://schemas.openxmlformats.org/presentationml/2006/main">
-  <p:cSld>
-    <p:spTree>
-      <p:nvGrpSpPr>
-        <p:cNvPr id="1" name=""/>
-        <p:cNvGrpSpPr/>
-        <p:nvPr/>
-      </p:nvGrpSpPr>
-      <p:grpSpPr>
-        <a:xfrm>
-          <a:off x="0" y="0"/>
-          <a:ext cx="0" cy="0"/>
-          <a:chOff x="0" y="0"/>
-          <a:chExt cx="0" cy="0"/>
-        </a:xfrm>
-      </p:grpSpPr>
-      <p:sp>
-        <p:nvSpPr>
-          <p:cNvPr id="2" name="Заголовок 1">
-            <a:extLst>
-              <a:ext uri="{FF2B5EF4-FFF2-40B4-BE49-F238E27FC236}">
-                <a16:creationId xmlns:a16="http://schemas.microsoft.com/office/drawing/2014/main" id="{769227ED-644A-4823-964A-94989ECC9DBF}"/>
-              </a:ext>
-            </a:extLst>
-          </p:cNvPr>
-          <p:cNvSpPr>
-            <a:spLocks noGrp="1"/>
-          </p:cNvSpPr>
-          <p:nvPr>
-            <p:ph type="title"/>
-          </p:nvPr>
-        </p:nvSpPr>
-        <p:spPr>
-          <a:xfrm>
-            <a:off x="639418" y="105258"/>
-            <a:ext cx="10515600" cy="106777"/>
-          </a:xfrm>
-        </p:spPr>
-        <p:txBody>
-          <a:bodyPr>
-            <a:normAutofit fontScale="90000"/>
-          </a:bodyPr>
-          <a:lstStyle/>
-          <a:p>
-            <a:r>
-              <a:rPr lang="ru-RU" dirty="0"/>
-              <a:t>Стек технологий</a:t>
-            </a:r>
-          </a:p>
-        </p:txBody>
-      </p:sp>
-      <p:sp>
-        <p:nvSpPr>
-          <p:cNvPr id="3" name="Объект 2">
-            <a:extLst>
-              <a:ext uri="{FF2B5EF4-FFF2-40B4-BE49-F238E27FC236}">
-                <a16:creationId xmlns:a16="http://schemas.microsoft.com/office/drawing/2014/main" id="{8A4FD324-9845-422A-96C8-115C622E7642}"/>
-              </a:ext>
-            </a:extLst>
-          </p:cNvPr>
-          <p:cNvSpPr>
-            <a:spLocks noGrp="1"/>
-          </p:cNvSpPr>
-          <p:nvPr>
-            <p:ph idx="1"/>
-          </p:nvPr>
-        </p:nvSpPr>
-        <p:spPr>
-          <a:xfrm>
-            <a:off x="304800" y="569844"/>
-            <a:ext cx="11049000" cy="6288156"/>
-          </a:xfrm>
-        </p:spPr>
-        <p:txBody>
-          <a:bodyPr>
-            <a:normAutofit fontScale="25000" lnSpcReduction="20000"/>
-          </a:bodyPr>
-          <a:lstStyle/>
-          <a:p>
-            <a:r>
-              <a:rPr lang="en-US" dirty="0"/>
-              <a:t>Backend Java 8</a:t>
-            </a:r>
-          </a:p>
-          <a:p>
-            <a:r>
-              <a:rPr lang="en-US" dirty="0"/>
-              <a:t>Frontend JavaScript </a:t>
-            </a:r>
-            <a:r>
-              <a:rPr lang="ru-RU" dirty="0"/>
-              <a:t>и </a:t>
-            </a:r>
-            <a:r>
-              <a:rPr lang="en-US" dirty="0"/>
-              <a:t>HTML</a:t>
-            </a:r>
-          </a:p>
-          <a:p>
-            <a:r>
-              <a:rPr lang="ru-RU" dirty="0"/>
-              <a:t>База данных </a:t>
-            </a:r>
-            <a:r>
-              <a:rPr lang="en-US" dirty="0"/>
-              <a:t>PostgreSQL</a:t>
-            </a:r>
-          </a:p>
-          <a:p>
-            <a:r>
-              <a:rPr lang="ru-RU" dirty="0">
-                <a:solidFill>
-                  <a:srgbClr val="202124"/>
-                </a:solidFill>
-                <a:latin typeface="Google Sans"/>
-              </a:rPr>
-              <a:t>Среда разработки </a:t>
-            </a:r>
-            <a:r>
-              <a:rPr lang="en-US" b="0" i="0" dirty="0">
-                <a:solidFill>
-                  <a:srgbClr val="202124"/>
-                </a:solidFill>
-                <a:effectLst/>
-                <a:latin typeface="Google Sans"/>
-              </a:rPr>
-              <a:t>IntelliJ IDEA</a:t>
-            </a:r>
-            <a:endParaRPr lang="ru-RU" b="0" i="0" dirty="0">
-              <a:solidFill>
-                <a:srgbClr val="202124"/>
-              </a:solidFill>
-              <a:effectLst/>
-              <a:latin typeface="Google Sans"/>
-            </a:endParaRPr>
-          </a:p>
-          <a:p>
-            <a:r>
-              <a:rPr lang="en-US" dirty="0">
-                <a:solidFill>
-                  <a:srgbClr val="202124"/>
-                </a:solidFill>
-                <a:latin typeface="Google Sans"/>
-              </a:rPr>
-              <a:t>Lombok</a:t>
-            </a:r>
-            <a:endParaRPr lang="ru-RU" dirty="0">
-              <a:solidFill>
-                <a:srgbClr val="202124"/>
-              </a:solidFill>
-              <a:latin typeface="Google Sans"/>
-            </a:endParaRPr>
-          </a:p>
-          <a:p>
-            <a:r>
-              <a:rPr lang="ru-RU" dirty="0" err="1">
-                <a:solidFill>
-                  <a:srgbClr val="202124"/>
-                </a:solidFill>
-                <a:latin typeface="Google Sans"/>
-              </a:rPr>
-              <a:t>Шаблонизатор</a:t>
-            </a:r>
-            <a:r>
-              <a:rPr lang="ru-RU" dirty="0">
-                <a:solidFill>
-                  <a:srgbClr val="202124"/>
-                </a:solidFill>
-                <a:latin typeface="Google Sans"/>
-              </a:rPr>
-              <a:t> </a:t>
-            </a:r>
-            <a:r>
-              <a:rPr lang="en-US" dirty="0" err="1">
-                <a:solidFill>
-                  <a:srgbClr val="202124"/>
-                </a:solidFill>
-                <a:latin typeface="Google Sans"/>
-              </a:rPr>
-              <a:t>Thymeleaf</a:t>
-            </a:r>
-            <a:endParaRPr lang="en-US" dirty="0">
-              <a:solidFill>
-                <a:srgbClr val="202124"/>
-              </a:solidFill>
-              <a:latin typeface="Google Sans"/>
-            </a:endParaRPr>
-          </a:p>
-          <a:p>
-            <a:endParaRPr lang="ru-RU" dirty="0">
-              <a:solidFill>
-                <a:srgbClr val="202124"/>
-              </a:solidFill>
-              <a:latin typeface="Google Sans"/>
-            </a:endParaRPr>
-          </a:p>
-          <a:p>
-            <a:r>
-              <a:rPr lang="en-US" dirty="0" err="1">
-                <a:solidFill>
-                  <a:srgbClr val="202124"/>
-                </a:solidFill>
-                <a:latin typeface="Google Sans"/>
-              </a:rPr>
-              <a:t>org.springframework.integration</a:t>
-            </a:r>
-            <a:r>
-              <a:rPr lang="ru-RU" dirty="0">
-                <a:solidFill>
-                  <a:srgbClr val="202124"/>
-                </a:solidFill>
-                <a:latin typeface="Google Sans"/>
-              </a:rPr>
-              <a:t> обмен сообщениями между </a:t>
-            </a:r>
-            <a:r>
-              <a:rPr lang="en-US" dirty="0">
-                <a:solidFill>
-                  <a:srgbClr val="202124"/>
-                </a:solidFill>
-                <a:latin typeface="Google Sans"/>
-              </a:rPr>
-              <a:t>Spring-</a:t>
-            </a:r>
-            <a:r>
-              <a:rPr lang="ru-RU" dirty="0">
-                <a:solidFill>
-                  <a:srgbClr val="202124"/>
-                </a:solidFill>
-                <a:latin typeface="Google Sans"/>
-              </a:rPr>
-              <a:t>приложениями</a:t>
-            </a:r>
-          </a:p>
-          <a:p>
-            <a:r>
-              <a:rPr lang="en-US" dirty="0" err="1">
-                <a:solidFill>
-                  <a:srgbClr val="202124"/>
-                </a:solidFill>
-                <a:latin typeface="Google Sans"/>
-              </a:rPr>
-              <a:t>org.springframework.boot</a:t>
-            </a:r>
-            <a:r>
-              <a:rPr lang="ru-RU" dirty="0">
-                <a:solidFill>
-                  <a:srgbClr val="202124"/>
-                </a:solidFill>
-                <a:latin typeface="Google Sans"/>
-              </a:rPr>
-              <a:t> – стандартные рутинные действия по созданию и ускорению работы </a:t>
-            </a:r>
-            <a:r>
-              <a:rPr lang="en-US" dirty="0">
-                <a:solidFill>
-                  <a:srgbClr val="202124"/>
-                </a:solidFill>
-                <a:latin typeface="Google Sans"/>
-              </a:rPr>
-              <a:t>Spring-</a:t>
-            </a:r>
-            <a:r>
-              <a:rPr lang="ru-RU" dirty="0">
-                <a:solidFill>
-                  <a:srgbClr val="202124"/>
-                </a:solidFill>
-                <a:latin typeface="Google Sans"/>
-              </a:rPr>
-              <a:t>приложений</a:t>
-            </a:r>
-          </a:p>
-          <a:p>
-            <a:pPr marL="0" indent="0">
-              <a:buNone/>
-            </a:pPr>
-            <a:r>
-              <a:rPr lang="en-US" dirty="0">
-                <a:solidFill>
-                  <a:srgbClr val="202124"/>
-                </a:solidFill>
-                <a:latin typeface="Google Sans"/>
-              </a:rPr>
-              <a:t>spring-boot-maven-plugin</a:t>
-            </a:r>
-            <a:r>
-              <a:rPr lang="ru-RU" dirty="0">
-                <a:solidFill>
-                  <a:srgbClr val="202124"/>
-                </a:solidFill>
-                <a:latin typeface="Google Sans"/>
-              </a:rPr>
-              <a:t> </a:t>
-            </a:r>
-            <a:r>
-              <a:rPr lang="ru-RU" b="0" i="0" dirty="0">
-                <a:solidFill>
-                  <a:srgbClr val="333333"/>
-                </a:solidFill>
-                <a:effectLst/>
-                <a:latin typeface="Helvetica" panose="020B0604020202020204" pitchFamily="34" charset="0"/>
-              </a:rPr>
-              <a:t>обеспечивает поддержку Spring </a:t>
-            </a:r>
-            <a:r>
-              <a:rPr lang="en-US" b="0" i="0" dirty="0">
-                <a:solidFill>
-                  <a:srgbClr val="333333"/>
-                </a:solidFill>
-                <a:effectLst/>
-                <a:latin typeface="Helvetica" panose="020B0604020202020204" pitchFamily="34" charset="0"/>
-              </a:rPr>
-              <a:t>Boot</a:t>
-            </a:r>
-            <a:r>
-              <a:rPr lang="ru-RU" b="0" i="0" dirty="0">
-                <a:solidFill>
-                  <a:srgbClr val="333333"/>
-                </a:solidFill>
-                <a:effectLst/>
-                <a:latin typeface="Helvetica" panose="020B0604020202020204" pitchFamily="34" charset="0"/>
-              </a:rPr>
-              <a:t> в </a:t>
-            </a:r>
-            <a:r>
-              <a:rPr lang="ru-RU" b="0" i="0" dirty="0" err="1">
-                <a:solidFill>
-                  <a:srgbClr val="333333"/>
-                </a:solidFill>
-                <a:effectLst/>
-                <a:latin typeface="Helvetica" panose="020B0604020202020204" pitchFamily="34" charset="0"/>
-              </a:rPr>
-              <a:t>Maven</a:t>
-            </a:r>
-            <a:endParaRPr lang="ru-RU" dirty="0">
-              <a:solidFill>
-                <a:srgbClr val="202124"/>
-              </a:solidFill>
-              <a:latin typeface="Google Sans"/>
-            </a:endParaRPr>
-          </a:p>
-          <a:p>
-            <a:pPr marL="0" indent="0">
-              <a:buNone/>
-            </a:pPr>
-            <a:r>
-              <a:rPr lang="en-US" dirty="0">
-                <a:solidFill>
-                  <a:srgbClr val="202124"/>
-                </a:solidFill>
-                <a:latin typeface="Google Sans"/>
-              </a:rPr>
-              <a:t>spring-boot-starter-data-</a:t>
-            </a:r>
-            <a:r>
-              <a:rPr lang="en-US" dirty="0" err="1">
-                <a:solidFill>
-                  <a:srgbClr val="202124"/>
-                </a:solidFill>
-                <a:latin typeface="Google Sans"/>
-              </a:rPr>
-              <a:t>jpa</a:t>
-            </a:r>
-            <a:r>
-              <a:rPr lang="ru-RU" dirty="0">
-                <a:solidFill>
-                  <a:srgbClr val="202124"/>
-                </a:solidFill>
-                <a:latin typeface="Google Sans"/>
-              </a:rPr>
-              <a:t> </a:t>
-            </a:r>
-            <a:r>
-              <a:rPr lang="en-US" b="0" i="0" dirty="0">
-                <a:solidFill>
-                  <a:srgbClr val="606060"/>
-                </a:solidFill>
-                <a:effectLst/>
-                <a:latin typeface="Verdana" panose="020B0604030504040204" pitchFamily="34" charset="0"/>
-              </a:rPr>
-              <a:t>Starter </a:t>
-            </a:r>
-            <a:r>
-              <a:rPr lang="ru-RU" b="0" i="0" dirty="0">
-                <a:solidFill>
-                  <a:srgbClr val="606060"/>
-                </a:solidFill>
-                <a:effectLst/>
-                <a:latin typeface="Verdana" panose="020B0604030504040204" pitchFamily="34" charset="0"/>
-              </a:rPr>
-              <a:t>для использования </a:t>
-            </a:r>
-            <a:r>
-              <a:rPr lang="en-US" b="0" i="0" dirty="0">
-                <a:solidFill>
-                  <a:srgbClr val="606060"/>
-                </a:solidFill>
-                <a:effectLst/>
-                <a:latin typeface="Verdana" panose="020B0604030504040204" pitchFamily="34" charset="0"/>
-              </a:rPr>
-              <a:t>Spring Data JPA </a:t>
-            </a:r>
-            <a:r>
-              <a:rPr lang="ru-RU" b="0" i="0" dirty="0">
-                <a:solidFill>
-                  <a:srgbClr val="606060"/>
-                </a:solidFill>
-                <a:effectLst/>
-                <a:latin typeface="Verdana" panose="020B0604030504040204" pitchFamily="34" charset="0"/>
-              </a:rPr>
-              <a:t>с </a:t>
-            </a:r>
-            <a:r>
-              <a:rPr lang="en-US" b="0" i="0" dirty="0">
-                <a:solidFill>
-                  <a:srgbClr val="606060"/>
-                </a:solidFill>
-                <a:effectLst/>
-                <a:latin typeface="Verdana" panose="020B0604030504040204" pitchFamily="34" charset="0"/>
-              </a:rPr>
-              <a:t>Hibernate</a:t>
-            </a:r>
-            <a:endParaRPr lang="ru-RU" dirty="0">
-              <a:solidFill>
-                <a:srgbClr val="202124"/>
-              </a:solidFill>
-              <a:latin typeface="Google Sans"/>
-            </a:endParaRPr>
-          </a:p>
-          <a:p>
-            <a:pPr marL="0" indent="0">
-              <a:buNone/>
-            </a:pPr>
-            <a:r>
-              <a:rPr lang="en-US" dirty="0">
-                <a:solidFill>
-                  <a:srgbClr val="202124"/>
-                </a:solidFill>
-                <a:latin typeface="Google Sans"/>
-              </a:rPr>
-              <a:t>spring-boot-starter-security</a:t>
-            </a:r>
-            <a:r>
-              <a:rPr lang="ru-RU" dirty="0">
-                <a:solidFill>
-                  <a:srgbClr val="202124"/>
-                </a:solidFill>
-                <a:latin typeface="Google Sans"/>
-              </a:rPr>
-              <a:t> </a:t>
-            </a:r>
-            <a:r>
-              <a:rPr lang="ru-RU" b="0" i="0" dirty="0" err="1">
-                <a:solidFill>
-                  <a:srgbClr val="606060"/>
-                </a:solidFill>
-                <a:effectLst/>
-                <a:latin typeface="Verdana" panose="020B0604030504040204" pitchFamily="34" charset="0"/>
-              </a:rPr>
-              <a:t>Starter</a:t>
-            </a:r>
-            <a:r>
-              <a:rPr lang="ru-RU" b="0" i="0" dirty="0">
-                <a:solidFill>
-                  <a:srgbClr val="606060"/>
-                </a:solidFill>
-                <a:effectLst/>
-                <a:latin typeface="Verdana" panose="020B0604030504040204" pitchFamily="34" charset="0"/>
-              </a:rPr>
-              <a:t> для использования Spring Security</a:t>
-            </a:r>
-            <a:endParaRPr lang="ru-RU" dirty="0">
-              <a:solidFill>
-                <a:srgbClr val="202124"/>
-              </a:solidFill>
-              <a:latin typeface="Google Sans"/>
-            </a:endParaRPr>
-          </a:p>
-          <a:p>
-            <a:pPr marL="0" indent="0">
-              <a:buNone/>
-            </a:pPr>
-            <a:r>
-              <a:rPr lang="en-US" dirty="0">
-                <a:solidFill>
-                  <a:srgbClr val="202124"/>
-                </a:solidFill>
-                <a:latin typeface="Google Sans"/>
-              </a:rPr>
-              <a:t>spring-boot-starter-</a:t>
-            </a:r>
-            <a:r>
-              <a:rPr lang="en-US" dirty="0" err="1">
-                <a:solidFill>
-                  <a:srgbClr val="202124"/>
-                </a:solidFill>
-                <a:latin typeface="Google Sans"/>
-              </a:rPr>
-              <a:t>thymeleaf</a:t>
-            </a:r>
-            <a:r>
-              <a:rPr lang="ru-RU" dirty="0">
-                <a:solidFill>
-                  <a:srgbClr val="202124"/>
-                </a:solidFill>
-                <a:latin typeface="Google Sans"/>
-              </a:rPr>
-              <a:t> </a:t>
-            </a:r>
-            <a:r>
-              <a:rPr lang="ru-RU" b="0" i="0" dirty="0" err="1">
-                <a:solidFill>
-                  <a:srgbClr val="606060"/>
-                </a:solidFill>
-                <a:effectLst/>
-                <a:latin typeface="Verdana" panose="020B0604030504040204" pitchFamily="34" charset="0"/>
-              </a:rPr>
-              <a:t>Starter</a:t>
-            </a:r>
-            <a:r>
-              <a:rPr lang="ru-RU" b="0" i="0" dirty="0">
-                <a:solidFill>
-                  <a:srgbClr val="606060"/>
-                </a:solidFill>
-                <a:effectLst/>
-                <a:latin typeface="Verdana" panose="020B0604030504040204" pitchFamily="34" charset="0"/>
-              </a:rPr>
-              <a:t> для создания MVC </a:t>
-            </a:r>
-            <a:r>
-              <a:rPr lang="ru-RU" b="0" i="0" dirty="0" err="1">
-                <a:solidFill>
-                  <a:srgbClr val="606060"/>
-                </a:solidFill>
-                <a:effectLst/>
-                <a:latin typeface="Verdana" panose="020B0604030504040204" pitchFamily="34" charset="0"/>
-              </a:rPr>
-              <a:t>web</a:t>
-            </a:r>
-            <a:r>
-              <a:rPr lang="ru-RU" b="0" i="0" dirty="0">
-                <a:solidFill>
-                  <a:srgbClr val="606060"/>
-                </a:solidFill>
-                <a:effectLst/>
-                <a:latin typeface="Verdana" panose="020B0604030504040204" pitchFamily="34" charset="0"/>
-              </a:rPr>
-              <a:t> приложений, используя </a:t>
-            </a:r>
-            <a:r>
-              <a:rPr lang="ru-RU" b="0" i="0" dirty="0" err="1">
-                <a:solidFill>
-                  <a:srgbClr val="606060"/>
-                </a:solidFill>
-                <a:effectLst/>
-                <a:latin typeface="Verdana" panose="020B0604030504040204" pitchFamily="34" charset="0"/>
-              </a:rPr>
-              <a:t>Thymeleaf</a:t>
-            </a:r>
-            <a:r>
-              <a:rPr lang="ru-RU" b="0" i="0" dirty="0">
-                <a:solidFill>
-                  <a:srgbClr val="606060"/>
-                </a:solidFill>
-                <a:effectLst/>
-                <a:latin typeface="Verdana" panose="020B0604030504040204" pitchFamily="34" charset="0"/>
-              </a:rPr>
-              <a:t> </a:t>
-            </a:r>
-            <a:r>
-              <a:rPr lang="ru-RU" b="0" i="0" dirty="0" err="1">
-                <a:solidFill>
-                  <a:srgbClr val="606060"/>
-                </a:solidFill>
-                <a:effectLst/>
-                <a:latin typeface="Verdana" panose="020B0604030504040204" pitchFamily="34" charset="0"/>
-              </a:rPr>
-              <a:t>views</a:t>
-            </a:r>
-            <a:endParaRPr lang="ru-RU" dirty="0">
-              <a:solidFill>
-                <a:srgbClr val="202124"/>
-              </a:solidFill>
-              <a:latin typeface="Google Sans"/>
-            </a:endParaRPr>
-          </a:p>
-          <a:p>
-            <a:pPr marL="0" indent="0">
-              <a:buNone/>
-            </a:pPr>
-            <a:r>
-              <a:rPr lang="en-US" dirty="0">
-                <a:solidFill>
-                  <a:srgbClr val="202124"/>
-                </a:solidFill>
-                <a:latin typeface="Google Sans"/>
-              </a:rPr>
-              <a:t>spring-boot-starter-web-services</a:t>
-            </a:r>
-            <a:r>
-              <a:rPr lang="ru-RU" dirty="0">
-                <a:solidFill>
-                  <a:srgbClr val="202124"/>
-                </a:solidFill>
-                <a:latin typeface="Google Sans"/>
-              </a:rPr>
-              <a:t> </a:t>
-            </a:r>
-            <a:r>
-              <a:rPr lang="ru-RU" b="0" i="0" dirty="0" err="1">
-                <a:solidFill>
-                  <a:srgbClr val="606060"/>
-                </a:solidFill>
-                <a:effectLst/>
-                <a:latin typeface="Verdana" panose="020B0604030504040204" pitchFamily="34" charset="0"/>
-              </a:rPr>
-              <a:t>Starter</a:t>
-            </a:r>
-            <a:r>
-              <a:rPr lang="ru-RU" b="0" i="0" dirty="0">
-                <a:solidFill>
-                  <a:srgbClr val="606060"/>
-                </a:solidFill>
-                <a:effectLst/>
-                <a:latin typeface="Verdana" panose="020B0604030504040204" pitchFamily="34" charset="0"/>
-              </a:rPr>
-              <a:t> для использования Spring Web Services</a:t>
-            </a:r>
-            <a:endParaRPr lang="ru-RU" dirty="0">
-              <a:solidFill>
-                <a:srgbClr val="202124"/>
-              </a:solidFill>
-              <a:latin typeface="Google Sans"/>
-            </a:endParaRPr>
-          </a:p>
-          <a:p>
-            <a:pPr marL="0" indent="0">
-              <a:buNone/>
-            </a:pPr>
-            <a:r>
-              <a:rPr lang="en-US" dirty="0">
-                <a:solidFill>
-                  <a:srgbClr val="202124"/>
-                </a:solidFill>
-                <a:latin typeface="Google Sans"/>
-              </a:rPr>
-              <a:t>spring-boot-starter-web</a:t>
-            </a:r>
-            <a:r>
-              <a:rPr lang="ru-RU" dirty="0">
-                <a:solidFill>
-                  <a:srgbClr val="202124"/>
-                </a:solidFill>
-                <a:latin typeface="Google Sans"/>
-              </a:rPr>
-              <a:t> </a:t>
-            </a:r>
-            <a:r>
-              <a:rPr lang="ru-RU" b="0" i="0" dirty="0" err="1">
-                <a:solidFill>
-                  <a:srgbClr val="606060"/>
-                </a:solidFill>
-                <a:effectLst/>
-                <a:latin typeface="Verdana" panose="020B0604030504040204" pitchFamily="34" charset="0"/>
-              </a:rPr>
-              <a:t>Starter</a:t>
-            </a:r>
-            <a:r>
-              <a:rPr lang="ru-RU" b="0" i="0" dirty="0">
-                <a:solidFill>
-                  <a:srgbClr val="606060"/>
-                </a:solidFill>
-                <a:effectLst/>
-                <a:latin typeface="Verdana" panose="020B0604030504040204" pitchFamily="34" charset="0"/>
-              </a:rPr>
-              <a:t> для создания </a:t>
-            </a:r>
-            <a:r>
-              <a:rPr lang="ru-RU" b="0" i="0" dirty="0" err="1">
-                <a:solidFill>
-                  <a:srgbClr val="606060"/>
-                </a:solidFill>
-                <a:effectLst/>
-                <a:latin typeface="Verdana" panose="020B0604030504040204" pitchFamily="34" charset="0"/>
-              </a:rPr>
-              <a:t>web</a:t>
-            </a:r>
-            <a:r>
-              <a:rPr lang="ru-RU" b="0" i="0" dirty="0">
-                <a:solidFill>
-                  <a:srgbClr val="606060"/>
-                </a:solidFill>
-                <a:effectLst/>
-                <a:latin typeface="Verdana" panose="020B0604030504040204" pitchFamily="34" charset="0"/>
-              </a:rPr>
-              <a:t>, включая </a:t>
-            </a:r>
-            <a:r>
-              <a:rPr lang="ru-RU" b="0" i="0" dirty="0" err="1">
-                <a:solidFill>
-                  <a:srgbClr val="606060"/>
-                </a:solidFill>
-                <a:effectLst/>
-                <a:latin typeface="Verdana" panose="020B0604030504040204" pitchFamily="34" charset="0"/>
-              </a:rPr>
-              <a:t>RESTful</a:t>
-            </a:r>
-            <a:r>
-              <a:rPr lang="ru-RU" b="0" i="0" dirty="0">
-                <a:solidFill>
-                  <a:srgbClr val="606060"/>
-                </a:solidFill>
-                <a:effectLst/>
-                <a:latin typeface="Verdana" panose="020B0604030504040204" pitchFamily="34" charset="0"/>
-              </a:rPr>
-              <a:t>, приложений, используя Spring MVC. Использует </a:t>
-            </a:r>
-            <a:r>
-              <a:rPr lang="ru-RU" b="0" i="0" dirty="0" err="1">
-                <a:solidFill>
-                  <a:srgbClr val="606060"/>
-                </a:solidFill>
-                <a:effectLst/>
-                <a:latin typeface="Verdana" panose="020B0604030504040204" pitchFamily="34" charset="0"/>
-              </a:rPr>
-              <a:t>Tomcat</a:t>
-            </a:r>
-            <a:r>
-              <a:rPr lang="ru-RU" b="0" i="0" dirty="0">
-                <a:solidFill>
-                  <a:srgbClr val="606060"/>
-                </a:solidFill>
-                <a:effectLst/>
-                <a:latin typeface="Verdana" panose="020B0604030504040204" pitchFamily="34" charset="0"/>
-              </a:rPr>
-              <a:t> как встроенный контейнер по умолчанию</a:t>
-            </a:r>
-            <a:endParaRPr lang="ru-RU" dirty="0">
-              <a:solidFill>
-                <a:srgbClr val="202124"/>
-              </a:solidFill>
-              <a:latin typeface="Google Sans"/>
-            </a:endParaRPr>
-          </a:p>
-          <a:p>
-            <a:pPr marL="0" indent="0">
-              <a:buNone/>
-            </a:pPr>
-            <a:r>
-              <a:rPr lang="en-US" dirty="0">
-                <a:solidFill>
-                  <a:srgbClr val="202124"/>
-                </a:solidFill>
-                <a:latin typeface="Google Sans"/>
-              </a:rPr>
-              <a:t>spring-boot-</a:t>
-            </a:r>
-            <a:r>
-              <a:rPr lang="en-US" dirty="0" err="1">
-                <a:solidFill>
-                  <a:srgbClr val="202124"/>
-                </a:solidFill>
-                <a:latin typeface="Google Sans"/>
-              </a:rPr>
-              <a:t>devtools</a:t>
-            </a:r>
-            <a:r>
-              <a:rPr lang="ru-RU" dirty="0">
-                <a:solidFill>
-                  <a:srgbClr val="202124"/>
-                </a:solidFill>
-                <a:latin typeface="Google Sans"/>
-              </a:rPr>
-              <a:t> </a:t>
-            </a:r>
-            <a:r>
-              <a:rPr lang="ru-RU" b="0" i="0" dirty="0" err="1">
-                <a:solidFill>
-                  <a:srgbClr val="606060"/>
-                </a:solidFill>
-                <a:effectLst/>
-                <a:latin typeface="Verdana" panose="020B0604030504040204" pitchFamily="34" charset="0"/>
-              </a:rPr>
-              <a:t>Starter</a:t>
-            </a:r>
-            <a:r>
-              <a:rPr lang="ru-RU" b="0" i="0" dirty="0">
-                <a:solidFill>
-                  <a:srgbClr val="606060"/>
-                </a:solidFill>
-                <a:effectLst/>
-                <a:latin typeface="Verdana" panose="020B0604030504040204" pitchFamily="34" charset="0"/>
-              </a:rPr>
-              <a:t> </a:t>
-            </a:r>
-            <a:r>
-              <a:rPr lang="ru-RU" b="0" i="0" dirty="0">
-                <a:solidFill>
-                  <a:srgbClr val="333333"/>
-                </a:solidFill>
-                <a:effectLst/>
-                <a:latin typeface="YS Text"/>
-              </a:rPr>
-              <a:t>для быстрого перезапуска приложения в горячей JVM при обнаружении изменений в скомпилированном коде или шаблонах; более того освобождает от очистки </a:t>
-            </a:r>
-            <a:r>
-              <a:rPr lang="ru-RU" b="0" i="0" dirty="0" err="1">
-                <a:solidFill>
-                  <a:srgbClr val="333333"/>
-                </a:solidFill>
-                <a:effectLst/>
-                <a:latin typeface="YS Text"/>
-              </a:rPr>
-              <a:t>cache</a:t>
-            </a:r>
-            <a:r>
-              <a:rPr lang="ru-RU" b="0" i="0" dirty="0">
-                <a:solidFill>
-                  <a:srgbClr val="333333"/>
-                </a:solidFill>
-                <a:effectLst/>
-                <a:latin typeface="YS Text"/>
-              </a:rPr>
-              <a:t> у </a:t>
-            </a:r>
-            <a:r>
-              <a:rPr lang="ru-RU" b="0" i="0" dirty="0" err="1">
-                <a:solidFill>
-                  <a:srgbClr val="333333"/>
-                </a:solidFill>
-                <a:effectLst/>
-                <a:latin typeface="YS Text"/>
-              </a:rPr>
-              <a:t>Thymeleaf</a:t>
-            </a:r>
-            <a:r>
-              <a:rPr lang="ru-RU" b="0" i="0" dirty="0">
-                <a:solidFill>
-                  <a:srgbClr val="333333"/>
-                </a:solidFill>
-                <a:effectLst/>
-                <a:latin typeface="YS Text"/>
-              </a:rPr>
-              <a:t>, если выбранный движок включен в проект.</a:t>
-            </a:r>
-            <a:endParaRPr lang="ru-RU" dirty="0">
-              <a:solidFill>
-                <a:srgbClr val="202124"/>
-              </a:solidFill>
-              <a:latin typeface="Google Sans"/>
-            </a:endParaRPr>
-          </a:p>
-          <a:p>
-            <a:pPr marL="0" indent="0">
-              <a:buNone/>
-            </a:pPr>
-            <a:r>
-              <a:rPr lang="en-US" dirty="0">
-                <a:solidFill>
-                  <a:srgbClr val="202124"/>
-                </a:solidFill>
-                <a:latin typeface="Google Sans"/>
-              </a:rPr>
-              <a:t>spring-boot-starter-test</a:t>
-            </a:r>
-            <a:r>
-              <a:rPr lang="ru-RU" dirty="0">
-                <a:solidFill>
-                  <a:srgbClr val="202124"/>
-                </a:solidFill>
-                <a:latin typeface="Google Sans"/>
-              </a:rPr>
-              <a:t> </a:t>
-            </a:r>
-            <a:r>
-              <a:rPr lang="en-US" b="0" i="0" dirty="0">
-                <a:solidFill>
-                  <a:srgbClr val="606060"/>
-                </a:solidFill>
-                <a:effectLst/>
-                <a:latin typeface="Verdana" panose="020B0604030504040204" pitchFamily="34" charset="0"/>
-              </a:rPr>
-              <a:t>Starter </a:t>
-            </a:r>
-            <a:r>
-              <a:rPr lang="ru-RU" b="0" i="0" dirty="0">
-                <a:solidFill>
-                  <a:srgbClr val="606060"/>
-                </a:solidFill>
-                <a:effectLst/>
-                <a:latin typeface="Verdana" panose="020B0604030504040204" pitchFamily="34" charset="0"/>
-              </a:rPr>
-              <a:t>для тестирования </a:t>
-            </a:r>
-            <a:r>
-              <a:rPr lang="en-US" b="0" i="0" dirty="0">
-                <a:solidFill>
-                  <a:srgbClr val="606060"/>
-                </a:solidFill>
-                <a:effectLst/>
-                <a:latin typeface="Verdana" panose="020B0604030504040204" pitchFamily="34" charset="0"/>
-              </a:rPr>
-              <a:t>Spring Boot </a:t>
-            </a:r>
-            <a:r>
-              <a:rPr lang="ru-RU" b="0" i="0" dirty="0">
-                <a:solidFill>
-                  <a:srgbClr val="606060"/>
-                </a:solidFill>
-                <a:effectLst/>
-                <a:latin typeface="Verdana" panose="020B0604030504040204" pitchFamily="34" charset="0"/>
-              </a:rPr>
-              <a:t>приложений с библиотеками </a:t>
-            </a:r>
-            <a:r>
-              <a:rPr lang="en-US" b="0" i="0" dirty="0">
-                <a:solidFill>
-                  <a:srgbClr val="606060"/>
-                </a:solidFill>
-                <a:effectLst/>
-                <a:latin typeface="Verdana" panose="020B0604030504040204" pitchFamily="34" charset="0"/>
-              </a:rPr>
-              <a:t>JUnit, </a:t>
-            </a:r>
-            <a:r>
-              <a:rPr lang="en-US" b="0" i="0" dirty="0" err="1">
-                <a:solidFill>
-                  <a:srgbClr val="606060"/>
-                </a:solidFill>
-                <a:effectLst/>
-                <a:latin typeface="Verdana" panose="020B0604030504040204" pitchFamily="34" charset="0"/>
-              </a:rPr>
-              <a:t>Hamcrest</a:t>
-            </a:r>
-            <a:r>
-              <a:rPr lang="en-US" b="0" i="0" dirty="0">
-                <a:solidFill>
-                  <a:srgbClr val="606060"/>
-                </a:solidFill>
-                <a:effectLst/>
-                <a:latin typeface="Verdana" panose="020B0604030504040204" pitchFamily="34" charset="0"/>
-              </a:rPr>
-              <a:t> </a:t>
-            </a:r>
-            <a:r>
-              <a:rPr lang="ru-RU" b="0" i="0" dirty="0">
-                <a:solidFill>
-                  <a:srgbClr val="606060"/>
-                </a:solidFill>
-                <a:effectLst/>
-                <a:latin typeface="Verdana" panose="020B0604030504040204" pitchFamily="34" charset="0"/>
-              </a:rPr>
-              <a:t>и </a:t>
-            </a:r>
-            <a:r>
-              <a:rPr lang="en-US" b="0" i="0" dirty="0">
-                <a:solidFill>
-                  <a:srgbClr val="606060"/>
-                </a:solidFill>
-                <a:effectLst/>
-                <a:latin typeface="Verdana" panose="020B0604030504040204" pitchFamily="34" charset="0"/>
-              </a:rPr>
-              <a:t>Mockito</a:t>
-            </a:r>
-            <a:endParaRPr lang="ru-RU" dirty="0">
-              <a:solidFill>
-                <a:srgbClr val="202124"/>
-              </a:solidFill>
-              <a:latin typeface="Google Sans"/>
-            </a:endParaRPr>
-          </a:p>
-          <a:p>
-            <a:r>
-              <a:rPr lang="en-US" dirty="0">
-                <a:solidFill>
-                  <a:srgbClr val="202124"/>
-                </a:solidFill>
-                <a:latin typeface="Google Sans"/>
-              </a:rPr>
-              <a:t>com.h2database </a:t>
-            </a:r>
-            <a:r>
-              <a:rPr lang="ru-RU" dirty="0">
-                <a:solidFill>
-                  <a:srgbClr val="202124"/>
-                </a:solidFill>
-                <a:latin typeface="Google Sans"/>
-              </a:rPr>
-              <a:t>подключение БД </a:t>
-            </a:r>
-            <a:r>
-              <a:rPr lang="en-US" dirty="0">
-                <a:solidFill>
-                  <a:srgbClr val="202124"/>
-                </a:solidFill>
-                <a:latin typeface="Google Sans"/>
-              </a:rPr>
-              <a:t>H2</a:t>
-            </a:r>
-            <a:endParaRPr lang="ru-RU" dirty="0">
-              <a:solidFill>
-                <a:srgbClr val="202124"/>
-              </a:solidFill>
-              <a:latin typeface="Google Sans"/>
-            </a:endParaRPr>
-          </a:p>
-          <a:p>
-            <a:r>
-              <a:rPr lang="en-US" dirty="0">
-                <a:solidFill>
-                  <a:srgbClr val="202124"/>
-                </a:solidFill>
-                <a:latin typeface="Google Sans"/>
-              </a:rPr>
-              <a:t>Wsdl4j </a:t>
-            </a:r>
-            <a:r>
-              <a:rPr lang="ru-RU" b="0" i="0" dirty="0">
-                <a:solidFill>
-                  <a:srgbClr val="111111"/>
-                </a:solidFill>
-                <a:effectLst/>
-                <a:latin typeface="-apple-system"/>
-              </a:rPr>
-              <a:t>WSDL-схема предназначена для описания </a:t>
-            </a:r>
-            <a:r>
-              <a:rPr lang="ru-RU" b="0" i="0" dirty="0">
-                <a:solidFill>
-                  <a:srgbClr val="333333"/>
-                </a:solidFill>
-                <a:effectLst/>
-                <a:latin typeface="Fira Sans" panose="020B0604020202020204" pitchFamily="34" charset="0"/>
-              </a:rPr>
-              <a:t>SOAP Web-сервис</a:t>
-            </a:r>
-            <a:r>
-              <a:rPr lang="ru-RU" b="0" i="0" dirty="0">
-                <a:solidFill>
-                  <a:srgbClr val="111111"/>
-                </a:solidFill>
-                <a:effectLst/>
-                <a:latin typeface="-apple-system"/>
-              </a:rPr>
-              <a:t>а</a:t>
-            </a:r>
-            <a:endParaRPr lang="ru-RU" dirty="0">
-              <a:solidFill>
-                <a:srgbClr val="202124"/>
-              </a:solidFill>
-              <a:latin typeface="Google Sans"/>
-            </a:endParaRPr>
-          </a:p>
-          <a:p>
-            <a:r>
-              <a:rPr lang="en-US" dirty="0" err="1">
-                <a:solidFill>
-                  <a:srgbClr val="202124"/>
-                </a:solidFill>
-                <a:latin typeface="Google Sans"/>
-              </a:rPr>
-              <a:t>org.flywaydb</a:t>
-            </a:r>
-            <a:r>
-              <a:rPr lang="en-US" dirty="0">
-                <a:solidFill>
-                  <a:srgbClr val="202124"/>
-                </a:solidFill>
-                <a:latin typeface="Google Sans"/>
-              </a:rPr>
-              <a:t> – </a:t>
-            </a:r>
-            <a:r>
-              <a:rPr lang="ru-RU" dirty="0">
-                <a:solidFill>
-                  <a:srgbClr val="202124"/>
-                </a:solidFill>
-                <a:latin typeface="Google Sans"/>
-              </a:rPr>
-              <a:t>контроль версий БД</a:t>
-            </a:r>
-          </a:p>
-          <a:p>
-            <a:r>
-              <a:rPr lang="en-US" dirty="0" err="1">
-                <a:solidFill>
-                  <a:srgbClr val="202124"/>
-                </a:solidFill>
-                <a:latin typeface="Google Sans"/>
-              </a:rPr>
-              <a:t>org.thymeleaf.extras</a:t>
-            </a:r>
-            <a:endParaRPr lang="ru-RU" dirty="0">
-              <a:solidFill>
-                <a:srgbClr val="202124"/>
-              </a:solidFill>
-              <a:latin typeface="Google Sans"/>
-            </a:endParaRPr>
-          </a:p>
-          <a:p>
-            <a:r>
-              <a:rPr lang="en-US" dirty="0" err="1">
-                <a:solidFill>
-                  <a:srgbClr val="202124"/>
-                </a:solidFill>
-                <a:latin typeface="Google Sans"/>
-              </a:rPr>
-              <a:t>org.springframework.security</a:t>
-            </a:r>
-            <a:r>
-              <a:rPr lang="ru-RU" dirty="0">
-                <a:solidFill>
-                  <a:srgbClr val="202124"/>
-                </a:solidFill>
-                <a:latin typeface="Google Sans"/>
-              </a:rPr>
-              <a:t> </a:t>
-            </a:r>
-            <a:r>
-              <a:rPr lang="ru-RU" b="0" i="0" dirty="0" err="1">
-                <a:solidFill>
-                  <a:srgbClr val="111111"/>
-                </a:solidFill>
-                <a:effectLst/>
-                <a:latin typeface="-apple-system"/>
-              </a:rPr>
-              <a:t>framework</a:t>
-            </a:r>
-            <a:r>
-              <a:rPr lang="ru-RU" b="0" i="0" dirty="0">
-                <a:solidFill>
-                  <a:srgbClr val="111111"/>
-                </a:solidFill>
-                <a:effectLst/>
-                <a:latin typeface="-apple-system"/>
-              </a:rPr>
-              <a:t>, предоставляющий механизмы построения систем аутентификации и авторизации, а также другие возможности обеспечения безопасности для корпоративных приложений, созданных с помощью Spring Framework</a:t>
-            </a:r>
-            <a:endParaRPr lang="ru-RU" dirty="0">
-              <a:solidFill>
-                <a:srgbClr val="202124"/>
-              </a:solidFill>
-              <a:latin typeface="Google Sans"/>
-            </a:endParaRPr>
-          </a:p>
-          <a:p>
-            <a:r>
-              <a:rPr lang="en-US" dirty="0" err="1">
-                <a:solidFill>
-                  <a:srgbClr val="202124"/>
-                </a:solidFill>
-                <a:latin typeface="Google Sans"/>
-              </a:rPr>
-              <a:t>org.mapstruct</a:t>
-            </a:r>
-            <a:r>
-              <a:rPr lang="ru-RU" dirty="0">
-                <a:solidFill>
-                  <a:srgbClr val="202124"/>
-                </a:solidFill>
-                <a:latin typeface="Google Sans"/>
-              </a:rPr>
-              <a:t> </a:t>
-            </a:r>
-            <a:r>
-              <a:rPr lang="ru-RU" b="0" i="0" dirty="0">
-                <a:solidFill>
-                  <a:srgbClr val="000000"/>
-                </a:solidFill>
-                <a:effectLst/>
-                <a:latin typeface="Helvetica Neue"/>
-              </a:rPr>
-              <a:t>обширный картограф для </a:t>
-            </a:r>
-            <a:r>
-              <a:rPr lang="en-US" b="0" i="0" dirty="0">
-                <a:solidFill>
-                  <a:srgbClr val="000000"/>
-                </a:solidFill>
-                <a:effectLst/>
-                <a:latin typeface="Helvetica Neue"/>
-              </a:rPr>
-              <a:t>Java-</a:t>
-            </a:r>
-            <a:r>
-              <a:rPr lang="ru-RU" b="0" i="0" dirty="0">
-                <a:solidFill>
-                  <a:srgbClr val="000000"/>
-                </a:solidFill>
-                <a:effectLst/>
-                <a:latin typeface="Helvetica Neue"/>
-              </a:rPr>
-              <a:t>компонентов для сопоставления объектов</a:t>
-            </a:r>
-            <a:endParaRPr lang="ru-RU" dirty="0">
-              <a:solidFill>
-                <a:srgbClr val="202124"/>
-              </a:solidFill>
-              <a:latin typeface="Google Sans"/>
-            </a:endParaRPr>
-          </a:p>
-          <a:p>
-            <a:pPr marL="0" indent="0">
-              <a:buNone/>
-            </a:pPr>
-            <a:r>
-              <a:rPr lang="en-US" dirty="0" err="1">
-                <a:solidFill>
-                  <a:srgbClr val="202124"/>
-                </a:solidFill>
-                <a:latin typeface="Google Sans"/>
-              </a:rPr>
-              <a:t>mapstruct</a:t>
-            </a:r>
-            <a:endParaRPr lang="ru-RU" dirty="0">
-              <a:solidFill>
-                <a:srgbClr val="202124"/>
-              </a:solidFill>
-              <a:latin typeface="Google Sans"/>
-            </a:endParaRPr>
-          </a:p>
-          <a:p>
-            <a:pPr marL="0" indent="0">
-              <a:buNone/>
-            </a:pPr>
-            <a:r>
-              <a:rPr lang="en-US" dirty="0" err="1">
-                <a:solidFill>
-                  <a:srgbClr val="202124"/>
-                </a:solidFill>
-                <a:latin typeface="Google Sans"/>
-              </a:rPr>
-              <a:t>mapstruct</a:t>
-            </a:r>
-            <a:r>
-              <a:rPr lang="en-US" dirty="0">
-                <a:solidFill>
-                  <a:srgbClr val="202124"/>
-                </a:solidFill>
-                <a:latin typeface="Google Sans"/>
-              </a:rPr>
-              <a:t>-processor</a:t>
-            </a:r>
-            <a:r>
-              <a:rPr lang="ru-RU" dirty="0">
-                <a:solidFill>
-                  <a:srgbClr val="202124"/>
-                </a:solidFill>
-                <a:latin typeface="Google Sans"/>
-              </a:rPr>
-              <a:t> </a:t>
-            </a:r>
-            <a:r>
-              <a:rPr lang="ru-RU" b="0" i="0" dirty="0">
-                <a:solidFill>
-                  <a:srgbClr val="4F4F4F"/>
-                </a:solidFill>
-                <a:effectLst/>
-                <a:latin typeface="-apple-system"/>
-              </a:rPr>
-              <a:t>Процессор аннотаций, который автоматически генерирует реализацию преобразователя на основе аннотаций.</a:t>
-            </a:r>
-            <a:endParaRPr lang="ru-RU" dirty="0">
-              <a:solidFill>
-                <a:srgbClr val="202124"/>
-              </a:solidFill>
-              <a:latin typeface="Google Sans"/>
-            </a:endParaRPr>
-          </a:p>
-          <a:p>
-            <a:r>
-              <a:rPr lang="en-US" dirty="0" err="1">
-                <a:solidFill>
-                  <a:srgbClr val="202124"/>
-                </a:solidFill>
-                <a:latin typeface="Google Sans"/>
-              </a:rPr>
-              <a:t>org.webjars</a:t>
-            </a:r>
-            <a:r>
-              <a:rPr lang="ru-RU" dirty="0">
-                <a:solidFill>
-                  <a:srgbClr val="202124"/>
-                </a:solidFill>
-                <a:latin typeface="Google Sans"/>
-              </a:rPr>
-              <a:t> для добавления </a:t>
-            </a:r>
-            <a:r>
-              <a:rPr lang="en-US" b="0" i="0" dirty="0" err="1">
-                <a:solidFill>
-                  <a:srgbClr val="111111"/>
-                </a:solidFill>
-                <a:effectLst/>
-                <a:latin typeface="-apple-system"/>
-              </a:rPr>
-              <a:t>javascript</a:t>
-            </a:r>
-            <a:r>
-              <a:rPr lang="en-US" b="0" i="0" dirty="0">
-                <a:solidFill>
-                  <a:srgbClr val="111111"/>
-                </a:solidFill>
-                <a:effectLst/>
-                <a:latin typeface="-apple-system"/>
-              </a:rPr>
-              <a:t> </a:t>
-            </a:r>
-            <a:r>
-              <a:rPr lang="ru-RU" b="0" i="0" dirty="0">
-                <a:solidFill>
-                  <a:srgbClr val="111111"/>
-                </a:solidFill>
-                <a:effectLst/>
-                <a:latin typeface="-apple-system"/>
-              </a:rPr>
-              <a:t>библиотек</a:t>
-            </a:r>
-            <a:endParaRPr lang="ru-RU" dirty="0">
-              <a:solidFill>
-                <a:srgbClr val="202124"/>
-              </a:solidFill>
-              <a:latin typeface="Google Sans"/>
-            </a:endParaRPr>
-          </a:p>
-          <a:p>
-            <a:pPr marL="0" indent="0">
-              <a:buNone/>
-            </a:pPr>
-            <a:r>
-              <a:rPr lang="en-US" dirty="0" err="1">
-                <a:solidFill>
-                  <a:srgbClr val="202124"/>
-                </a:solidFill>
-                <a:latin typeface="Google Sans"/>
-              </a:rPr>
-              <a:t>sockjs</a:t>
-            </a:r>
-            <a:r>
-              <a:rPr lang="en-US" dirty="0">
-                <a:solidFill>
-                  <a:srgbClr val="202124"/>
-                </a:solidFill>
-                <a:latin typeface="Google Sans"/>
-              </a:rPr>
-              <a:t>-client</a:t>
-            </a:r>
-            <a:endParaRPr lang="ru-RU" dirty="0">
-              <a:solidFill>
-                <a:srgbClr val="202124"/>
-              </a:solidFill>
-              <a:latin typeface="Google Sans"/>
-            </a:endParaRPr>
-          </a:p>
-          <a:p>
-            <a:pPr marL="0" indent="0">
-              <a:buNone/>
-            </a:pPr>
-            <a:r>
-              <a:rPr lang="en-US" dirty="0">
-                <a:solidFill>
-                  <a:srgbClr val="202124"/>
-                </a:solidFill>
-                <a:latin typeface="Google Sans"/>
-              </a:rPr>
-              <a:t>stomp-</a:t>
-            </a:r>
-            <a:r>
-              <a:rPr lang="en-US" dirty="0" err="1">
-                <a:solidFill>
-                  <a:srgbClr val="202124"/>
-                </a:solidFill>
-                <a:latin typeface="Google Sans"/>
-              </a:rPr>
-              <a:t>websocket</a:t>
-            </a:r>
-            <a:endParaRPr lang="ru-RU" dirty="0">
-              <a:solidFill>
-                <a:srgbClr val="202124"/>
-              </a:solidFill>
-              <a:latin typeface="Google Sans"/>
-            </a:endParaRPr>
-          </a:p>
-          <a:p>
-            <a:pPr marL="0" indent="0">
-              <a:buNone/>
-            </a:pPr>
-            <a:r>
-              <a:rPr lang="en-US" dirty="0" err="1">
-                <a:solidFill>
-                  <a:srgbClr val="202124"/>
-                </a:solidFill>
-                <a:latin typeface="Google Sans"/>
-              </a:rPr>
-              <a:t>jquery</a:t>
-            </a:r>
-            <a:endParaRPr lang="ru-RU" dirty="0">
-              <a:solidFill>
-                <a:srgbClr val="202124"/>
-              </a:solidFill>
-              <a:latin typeface="Google Sans"/>
-            </a:endParaRPr>
-          </a:p>
-          <a:p>
-            <a:pPr marL="0" indent="0">
-              <a:buNone/>
-            </a:pPr>
-            <a:r>
-              <a:rPr lang="en-US" dirty="0" err="1">
-                <a:solidFill>
-                  <a:srgbClr val="202124"/>
-                </a:solidFill>
-                <a:latin typeface="Google Sans"/>
-              </a:rPr>
-              <a:t>webjars</a:t>
-            </a:r>
-            <a:r>
-              <a:rPr lang="en-US" dirty="0">
-                <a:solidFill>
-                  <a:srgbClr val="202124"/>
-                </a:solidFill>
-                <a:latin typeface="Google Sans"/>
-              </a:rPr>
-              <a:t>-locator</a:t>
-            </a:r>
-          </a:p>
-          <a:p>
-            <a:endParaRPr lang="ru-RU" dirty="0"/>
-          </a:p>
-        </p:txBody>
-      </p:sp>
-    </p:spTree>
-    <p:extLst>
-      <p:ext uri="{BB962C8B-B14F-4D97-AF65-F5344CB8AC3E}">
-        <p14:creationId xmlns:p14="http://schemas.microsoft.com/office/powerpoint/2010/main" val="1930626612"/>
-      </p:ext>
-    </p:extLst>
-  </p:cSld>
-  <p:clrMapOvr>
-    <a:masterClrMapping/>
-  </p:clrMapOvr>
-</p:sld>
-</file>
-
-<file path=ppt/slides/slide13.xml><?xml version="1.0" encoding="utf-8"?>
-<p:sld xmlns:a="http://schemas.openxmlformats.org/drawingml/2006/main" xmlns:r="http://schemas.openxmlformats.org/officeDocument/2006/relationships" xmlns:p="http://schemas.openxmlformats.org/presentationml/2006/main">
-  <p:cSld>
-    <p:spTree>
-      <p:nvGrpSpPr>
-        <p:cNvPr id="1" name=""/>
-        <p:cNvGrpSpPr/>
-        <p:nvPr/>
-      </p:nvGrpSpPr>
-      <p:grpSpPr>
-        <a:xfrm>
-          <a:off x="0" y="0"/>
-          <a:ext cx="0" cy="0"/>
-          <a:chOff x="0" y="0"/>
-          <a:chExt cx="0" cy="0"/>
-        </a:xfrm>
-      </p:grpSpPr>
-      <p:sp>
-        <p:nvSpPr>
-          <p:cNvPr id="2" name="Заголовок 1">
-            <a:extLst>
-              <a:ext uri="{FF2B5EF4-FFF2-40B4-BE49-F238E27FC236}">
-                <a16:creationId xmlns:a16="http://schemas.microsoft.com/office/drawing/2014/main" id="{E5F70F30-57D5-48E7-B75F-042FD31C973D}"/>
-              </a:ext>
-            </a:extLst>
-          </p:cNvPr>
-          <p:cNvSpPr>
-            <a:spLocks noGrp="1"/>
-          </p:cNvSpPr>
-          <p:nvPr>
-            <p:ph type="title"/>
-          </p:nvPr>
-        </p:nvSpPr>
-        <p:spPr/>
-        <p:txBody>
-          <a:bodyPr/>
-          <a:lstStyle/>
-          <a:p>
-            <a:endParaRPr lang="ru-RU"/>
-          </a:p>
-        </p:txBody>
-      </p:sp>
-      <p:sp>
-        <p:nvSpPr>
-          <p:cNvPr id="3" name="Объект 2">
-            <a:extLst>
-              <a:ext uri="{FF2B5EF4-FFF2-40B4-BE49-F238E27FC236}">
-                <a16:creationId xmlns:a16="http://schemas.microsoft.com/office/drawing/2014/main" id="{C8944B83-F70E-4C19-8772-10151EB504BE}"/>
-              </a:ext>
-            </a:extLst>
-          </p:cNvPr>
-          <p:cNvSpPr>
-            <a:spLocks noGrp="1"/>
-          </p:cNvSpPr>
-          <p:nvPr>
-            <p:ph idx="1"/>
-          </p:nvPr>
-        </p:nvSpPr>
-        <p:spPr/>
-        <p:txBody>
-          <a:bodyPr>
-            <a:normAutofit lnSpcReduction="10000"/>
-          </a:bodyPr>
-          <a:lstStyle/>
-          <a:p>
-            <a:r>
-              <a:rPr lang="en-US" b="0" i="1" dirty="0" err="1">
-                <a:solidFill>
-                  <a:srgbClr val="333333"/>
-                </a:solidFill>
-                <a:effectLst/>
-                <a:latin typeface="Roboto" panose="02000000000000000000" pitchFamily="2" charset="0"/>
-              </a:rPr>
-              <a:t>flyway_schema_history</a:t>
-            </a:r>
-            <a:r>
-              <a:rPr lang="ru-RU" b="0" i="1" dirty="0">
-                <a:solidFill>
-                  <a:srgbClr val="333333"/>
-                </a:solidFill>
-                <a:effectLst/>
-                <a:latin typeface="Roboto" panose="02000000000000000000" pitchFamily="2" charset="0"/>
-              </a:rPr>
-              <a:t> </a:t>
-            </a:r>
-            <a:r>
-              <a:rPr lang="ru-RU" b="0" i="0" dirty="0">
-                <a:solidFill>
-                  <a:srgbClr val="333333"/>
-                </a:solidFill>
-                <a:effectLst/>
-                <a:latin typeface="Roboto" panose="02000000000000000000" pitchFamily="2" charset="0"/>
-              </a:rPr>
-              <a:t>Эта таблица будет использоваться для отслеживания состояния базы данных, она хранит информацию о миграциях БД</a:t>
-            </a:r>
-          </a:p>
-          <a:p>
-            <a:endParaRPr lang="ru-RU" dirty="0">
-              <a:solidFill>
-                <a:srgbClr val="333333"/>
-              </a:solidFill>
-              <a:latin typeface="Roboto" panose="02000000000000000000" pitchFamily="2" charset="0"/>
-            </a:endParaRPr>
-          </a:p>
-          <a:p>
-            <a:r>
-              <a:rPr lang="ru-RU" b="0" i="1" dirty="0">
-                <a:solidFill>
-                  <a:srgbClr val="000000"/>
-                </a:solidFill>
-                <a:effectLst/>
-                <a:latin typeface="Helvetica Neue"/>
-              </a:rPr>
-              <a:t>Объекты передачи данных</a:t>
-            </a:r>
-            <a:r>
-              <a:rPr lang="ru-RU" b="0" i="0" dirty="0">
-                <a:solidFill>
-                  <a:srgbClr val="000000"/>
-                </a:solidFill>
-                <a:effectLst/>
-                <a:latin typeface="Helvetica Neue"/>
-              </a:rPr>
-              <a:t> (</a:t>
-            </a:r>
-            <a:r>
-              <a:rPr lang="ru-RU" b="0" i="0" dirty="0" err="1">
-                <a:solidFill>
-                  <a:srgbClr val="000000"/>
-                </a:solidFill>
-                <a:effectLst/>
-                <a:latin typeface="Helvetica Neue"/>
-              </a:rPr>
-              <a:t>DTOs</a:t>
-            </a:r>
-            <a:r>
-              <a:rPr lang="ru-RU" b="0" i="0" dirty="0">
-                <a:solidFill>
-                  <a:srgbClr val="000000"/>
-                </a:solidFill>
-                <a:effectLst/>
-                <a:latin typeface="Helvetica Neue"/>
-              </a:rPr>
-              <a:t>) регулярно применяются в этих приложениях. DTO-это просто объекты, которые содержат запрошенную информацию о другом объекте. Как правило, объем информации ограничен. Поскольку DTO являются отражением исходных объектов – </a:t>
-            </a:r>
-            <a:r>
-              <a:rPr lang="ru-RU" b="0" i="1" dirty="0" err="1">
-                <a:solidFill>
-                  <a:srgbClr val="000000"/>
-                </a:solidFill>
-                <a:effectLst/>
-                <a:latin typeface="Helvetica Neue"/>
-              </a:rPr>
-              <a:t>сопоставители</a:t>
-            </a:r>
-            <a:r>
-              <a:rPr lang="ru-RU" b="0" i="0" dirty="0">
-                <a:solidFill>
-                  <a:srgbClr val="000000"/>
-                </a:solidFill>
-                <a:effectLst/>
-                <a:latin typeface="Helvetica Neue"/>
-              </a:rPr>
-              <a:t> между этими классами играют ключевую роль в процессе преобразования.</a:t>
-            </a:r>
-            <a:endParaRPr lang="ru-RU" dirty="0"/>
-          </a:p>
-        </p:txBody>
-      </p:sp>
-    </p:spTree>
-    <p:extLst>
-      <p:ext uri="{BB962C8B-B14F-4D97-AF65-F5344CB8AC3E}">
-        <p14:creationId xmlns:p14="http://schemas.microsoft.com/office/powerpoint/2010/main" val="3006375653"/>
-      </p:ext>
-    </p:extLst>
-  </p:cSld>
-  <p:clrMapOvr>
-    <a:masterClrMapping/>
-  </p:clrMapOvr>
-</p:sld>
-</file>
-
-<file path=ppt/slides/slide14.xml><?xml version="1.0" encoding="utf-8"?>
-<p:sld xmlns:a="http://schemas.openxmlformats.org/drawingml/2006/main" xmlns:r="http://schemas.openxmlformats.org/officeDocument/2006/relationships" xmlns:p="http://schemas.openxmlformats.org/presentationml/2006/main">
-  <p:cSld>
-    <p:spTree>
-      <p:nvGrpSpPr>
-        <p:cNvPr id="1" name=""/>
-        <p:cNvGrpSpPr/>
-        <p:nvPr/>
-      </p:nvGrpSpPr>
-      <p:grpSpPr>
-        <a:xfrm>
-          <a:off x="0" y="0"/>
-          <a:ext cx="0" cy="0"/>
-          <a:chOff x="0" y="0"/>
-          <a:chExt cx="0" cy="0"/>
-        </a:xfrm>
-      </p:grpSpPr>
-      <p:sp>
-        <p:nvSpPr>
-          <p:cNvPr id="2" name="Заголовок 1">
-            <a:extLst>
-              <a:ext uri="{FF2B5EF4-FFF2-40B4-BE49-F238E27FC236}">
-                <a16:creationId xmlns:a16="http://schemas.microsoft.com/office/drawing/2014/main" id="{58E12946-FAB3-457B-8432-B4AD452468B5}"/>
-              </a:ext>
-            </a:extLst>
-          </p:cNvPr>
-          <p:cNvSpPr>
-            <a:spLocks noGrp="1"/>
-          </p:cNvSpPr>
-          <p:nvPr>
-            <p:ph type="title"/>
-          </p:nvPr>
-        </p:nvSpPr>
-        <p:spPr/>
-        <p:txBody>
-          <a:bodyPr/>
-          <a:lstStyle/>
-          <a:p>
-            <a:endParaRPr lang="ru-RU"/>
-          </a:p>
-        </p:txBody>
-      </p:sp>
-      <p:sp>
-        <p:nvSpPr>
-          <p:cNvPr id="3" name="Объект 2">
-            <a:extLst>
-              <a:ext uri="{FF2B5EF4-FFF2-40B4-BE49-F238E27FC236}">
-                <a16:creationId xmlns:a16="http://schemas.microsoft.com/office/drawing/2014/main" id="{386C29C6-7B17-42A7-8F39-181B24B6FABC}"/>
-              </a:ext>
-            </a:extLst>
-          </p:cNvPr>
-          <p:cNvSpPr>
-            <a:spLocks noGrp="1"/>
-          </p:cNvSpPr>
-          <p:nvPr>
-            <p:ph idx="1"/>
-          </p:nvPr>
-        </p:nvSpPr>
-        <p:spPr/>
-        <p:txBody>
-          <a:bodyPr>
-            <a:normAutofit fontScale="92500" lnSpcReduction="10000"/>
-          </a:bodyPr>
-          <a:lstStyle/>
-          <a:p>
-            <a:pPr algn="l"/>
-            <a:r>
-              <a:rPr lang="ru-RU" b="0" i="0" dirty="0">
-                <a:solidFill>
-                  <a:srgbClr val="000000"/>
-                </a:solidFill>
-                <a:effectLst/>
-                <a:latin typeface="-apple-system"/>
-              </a:rPr>
-              <a:t>Веб-сервисы Spring без проблем используют такие концепции Spring, как внедрение зависимостей и конфигурации. Spring-WS требует Spring 3.0 версии. При разработке сначала контракта мы начинаем с </a:t>
-            </a:r>
-            <a:r>
-              <a:rPr lang="ru-RU" b="1" i="0" dirty="0">
-                <a:solidFill>
-                  <a:srgbClr val="000000"/>
-                </a:solidFill>
-                <a:effectLst/>
-                <a:latin typeface="-apple-system"/>
-              </a:rPr>
-              <a:t>WSDL </a:t>
-            </a:r>
-            <a:r>
-              <a:rPr lang="ru-RU" b="1" i="0" dirty="0" err="1">
-                <a:solidFill>
-                  <a:srgbClr val="000000"/>
-                </a:solidFill>
-                <a:effectLst/>
-                <a:latin typeface="-apple-system"/>
-              </a:rPr>
-              <a:t>Contract</a:t>
-            </a:r>
-            <a:r>
-              <a:rPr lang="ru-RU" b="1" i="0" dirty="0">
-                <a:solidFill>
-                  <a:srgbClr val="000000"/>
-                </a:solidFill>
-                <a:effectLst/>
-                <a:latin typeface="-apple-system"/>
-              </a:rPr>
-              <a:t>,</a:t>
-            </a:r>
-            <a:r>
-              <a:rPr lang="ru-RU" b="0" i="0" dirty="0">
-                <a:solidFill>
-                  <a:srgbClr val="000000"/>
-                </a:solidFill>
-                <a:effectLst/>
-                <a:latin typeface="-apple-system"/>
-              </a:rPr>
-              <a:t> а затем будем использовать JAVA для реализации требуемого контракта.</a:t>
-            </a:r>
-          </a:p>
-          <a:p>
-            <a:pPr algn="l"/>
-            <a:r>
-              <a:rPr lang="ru-RU" b="0" i="0" dirty="0">
-                <a:solidFill>
-                  <a:srgbClr val="000000"/>
-                </a:solidFill>
-                <a:effectLst/>
-                <a:latin typeface="-apple-system"/>
-              </a:rPr>
-              <a:t>В отличие от подхода «последний контракт», когда интерфейсы JAVA генерируют контракт WSDL / XSD. Контракт на основе WSDL остается независимым от реализации JAVA в подходе контракт-первый. В случае, если нам требуется изменить интерфейсы JAVA, нет необходимости сообщать об изменениях, внесенных в существующий контракт WSDL, пользователям веб-служб. Spring-WS стремится обеспечить слабую связь между контрактом WSDL и его реализацией на основе JAVA.</a:t>
-            </a:r>
-          </a:p>
-          <a:p>
-            <a:endParaRPr lang="ru-RU" dirty="0"/>
-          </a:p>
-        </p:txBody>
-      </p:sp>
-    </p:spTree>
-    <p:extLst>
-      <p:ext uri="{BB962C8B-B14F-4D97-AF65-F5344CB8AC3E}">
-        <p14:creationId xmlns:p14="http://schemas.microsoft.com/office/powerpoint/2010/main" val="2693835780"/>
-      </p:ext>
-    </p:extLst>
-  </p:cSld>
-  <p:clrMapOvr>
-    <a:masterClrMapping/>
-  </p:clrMapOvr>
-</p:sld>
-</file>
-
 <file path=ppt/slides/slide2.xml><?xml version="1.0" encoding="utf-8"?>
 <p:sld xmlns:a="http://schemas.openxmlformats.org/drawingml/2006/main" xmlns:r="http://schemas.openxmlformats.org/officeDocument/2006/relationships" xmlns:p="http://schemas.openxmlformats.org/presentationml/2006/main">
   <p:cSld>
@@ -6822,89 +4200,6 @@
 </file>
 
 <file path=ppt/slides/slide6.xml><?xml version="1.0" encoding="utf-8"?>
-<p:sld xmlns:a="http://schemas.openxmlformats.org/drawingml/2006/main" xmlns:r="http://schemas.openxmlformats.org/officeDocument/2006/relationships" xmlns:p="http://schemas.openxmlformats.org/presentationml/2006/main">
-  <p:cSld>
-    <p:spTree>
-      <p:nvGrpSpPr>
-        <p:cNvPr id="1" name=""/>
-        <p:cNvGrpSpPr/>
-        <p:nvPr/>
-      </p:nvGrpSpPr>
-      <p:grpSpPr>
-        <a:xfrm>
-          <a:off x="0" y="0"/>
-          <a:ext cx="0" cy="0"/>
-          <a:chOff x="0" y="0"/>
-          <a:chExt cx="0" cy="0"/>
-        </a:xfrm>
-      </p:grpSpPr>
-      <p:sp>
-        <p:nvSpPr>
-          <p:cNvPr id="2" name="Заголовок 1">
-            <a:extLst>
-              <a:ext uri="{FF2B5EF4-FFF2-40B4-BE49-F238E27FC236}">
-                <a16:creationId xmlns:a16="http://schemas.microsoft.com/office/drawing/2014/main" id="{9BFD294A-517B-4C10-A9DC-AC7BEB490CBC}"/>
-              </a:ext>
-            </a:extLst>
-          </p:cNvPr>
-          <p:cNvSpPr>
-            <a:spLocks noGrp="1"/>
-          </p:cNvSpPr>
-          <p:nvPr>
-            <p:ph type="title"/>
-          </p:nvPr>
-        </p:nvSpPr>
-        <p:spPr/>
-        <p:txBody>
-          <a:bodyPr/>
-          <a:lstStyle/>
-          <a:p>
-            <a:r>
-              <a:rPr lang="ru-RU" dirty="0"/>
-              <a:t>Описание бизнес процесса</a:t>
-            </a:r>
-          </a:p>
-        </p:txBody>
-      </p:sp>
-      <p:sp>
-        <p:nvSpPr>
-          <p:cNvPr id="3" name="Объект 2">
-            <a:extLst>
-              <a:ext uri="{FF2B5EF4-FFF2-40B4-BE49-F238E27FC236}">
-                <a16:creationId xmlns:a16="http://schemas.microsoft.com/office/drawing/2014/main" id="{BEC731E9-7201-4D35-97C6-313D894616A9}"/>
-              </a:ext>
-            </a:extLst>
-          </p:cNvPr>
-          <p:cNvSpPr>
-            <a:spLocks noGrp="1"/>
-          </p:cNvSpPr>
-          <p:nvPr>
-            <p:ph idx="1"/>
-          </p:nvPr>
-        </p:nvSpPr>
-        <p:spPr/>
-        <p:txBody>
-          <a:bodyPr/>
-          <a:lstStyle/>
-          <a:p>
-            <a:endParaRPr lang="ru-RU"/>
-          </a:p>
-        </p:txBody>
-      </p:sp>
-    </p:spTree>
-    <p:extLst>
-      <p:ext uri="{BB962C8B-B14F-4D97-AF65-F5344CB8AC3E}">
-        <p14:creationId xmlns:p14="http://schemas.microsoft.com/office/powerpoint/2010/main" val="1338892248"/>
-      </p:ext>
-    </p:extLst>
-  </p:cSld>
-  <p:clrMapOvr>
-    <a:masterClrMapping/>
-  </p:clrMapOvr>
-</p:sld>
-</file>
-
-<file path=ppt/slides/slide7.xml><?xml version="1.0" encoding="utf-8"?>
 <p:sld xmlns:a="http://schemas.openxmlformats.org/drawingml/2006/main" xmlns:r="http://schemas.openxmlformats.org/officeDocument/2006/relationships" xmlns:p="http://schemas.openxmlformats.org/presentationml/2006/main">
   <p:cSld>
     <p:spTree>
@@ -7857,7 +5152,7 @@
 </p:sld>
 </file>
 
-<file path=ppt/slides/slide8.xml><?xml version="1.0" encoding="utf-8"?>
+<file path=ppt/slides/slide7.xml><?xml version="1.0" encoding="utf-8"?>
 <p:sld xmlns:a="http://schemas.openxmlformats.org/drawingml/2006/main" xmlns:r="http://schemas.openxmlformats.org/officeDocument/2006/relationships" xmlns:p="http://schemas.openxmlformats.org/presentationml/2006/main">
   <p:cSld>
     <p:spTree>
@@ -7944,86 +5239,6 @@
     <p:extLst>
       <p:ext uri="{BB962C8B-B14F-4D97-AF65-F5344CB8AC3E}">
         <p14:creationId xmlns:p14="http://schemas.microsoft.com/office/powerpoint/2010/main" val="315978693"/>
-      </p:ext>
-    </p:extLst>
-  </p:cSld>
-  <p:clrMapOvr>
-    <a:masterClrMapping/>
-  </p:clrMapOvr>
-</p:sld>
-</file>
-
-<file path=ppt/slides/slide9.xml><?xml version="1.0" encoding="utf-8"?>
-<p:sld xmlns:a="http://schemas.openxmlformats.org/drawingml/2006/main" xmlns:r="http://schemas.openxmlformats.org/officeDocument/2006/relationships" xmlns:p="http://schemas.openxmlformats.org/presentationml/2006/main">
-  <p:cSld>
-    <p:spTree>
-      <p:nvGrpSpPr>
-        <p:cNvPr id="1" name=""/>
-        <p:cNvGrpSpPr/>
-        <p:nvPr/>
-      </p:nvGrpSpPr>
-      <p:grpSpPr>
-        <a:xfrm>
-          <a:off x="0" y="0"/>
-          <a:ext cx="0" cy="0"/>
-          <a:chOff x="0" y="0"/>
-          <a:chExt cx="0" cy="0"/>
-        </a:xfrm>
-      </p:grpSpPr>
-      <p:sp>
-        <p:nvSpPr>
-          <p:cNvPr id="2" name="Заголовок 1">
-            <a:extLst>
-              <a:ext uri="{FF2B5EF4-FFF2-40B4-BE49-F238E27FC236}">
-                <a16:creationId xmlns:a16="http://schemas.microsoft.com/office/drawing/2014/main" id="{EF24B39D-B028-43C7-A06D-3EA69C6093D9}"/>
-              </a:ext>
-            </a:extLst>
-          </p:cNvPr>
-          <p:cNvSpPr>
-            <a:spLocks noGrp="1"/>
-          </p:cNvSpPr>
-          <p:nvPr>
-            <p:ph type="title"/>
-          </p:nvPr>
-        </p:nvSpPr>
-        <p:spPr/>
-        <p:txBody>
-          <a:bodyPr/>
-          <a:lstStyle/>
-          <a:p>
-            <a:endParaRPr lang="ru-RU"/>
-          </a:p>
-        </p:txBody>
-      </p:sp>
-      <p:sp>
-        <p:nvSpPr>
-          <p:cNvPr id="3" name="Объект 2">
-            <a:extLst>
-              <a:ext uri="{FF2B5EF4-FFF2-40B4-BE49-F238E27FC236}">
-                <a16:creationId xmlns:a16="http://schemas.microsoft.com/office/drawing/2014/main" id="{2F902E5A-CBB8-499E-BA6E-2A2832F90A5A}"/>
-              </a:ext>
-            </a:extLst>
-          </p:cNvPr>
-          <p:cNvSpPr>
-            <a:spLocks noGrp="1"/>
-          </p:cNvSpPr>
-          <p:nvPr>
-            <p:ph idx="1"/>
-          </p:nvPr>
-        </p:nvSpPr>
-        <p:spPr/>
-        <p:txBody>
-          <a:bodyPr/>
-          <a:lstStyle/>
-          <a:p>
-            <a:endParaRPr lang="ru-RU"/>
-          </a:p>
-        </p:txBody>
-      </p:sp>
-    </p:spTree>
-    <p:extLst>
-      <p:ext uri="{BB962C8B-B14F-4D97-AF65-F5344CB8AC3E}">
-        <p14:creationId xmlns:p14="http://schemas.microsoft.com/office/powerpoint/2010/main" val="3455034796"/>
       </p:ext>
     </p:extLst>
   </p:cSld>

</xml_diff>